<commit_message>
post on polygon extraction
</commit_message>
<xml_diff>
--- a/content/img/blog-images.pptx
+++ b/content/img/blog-images.pptx
@@ -6,6 +6,7 @@
   </p:sldMasterIdLst>
   <p:sldIdLst>
     <p:sldId id="256" r:id="rId2"/>
+    <p:sldId id="257" r:id="rId3"/>
   </p:sldIdLst>
   <p:sldSz cx="12192000" cy="6858000"/>
   <p:notesSz cx="6858000" cy="9144000"/>
@@ -104,6 +105,11 @@
       </a:defRPr>
     </a:lvl9pPr>
   </p:defaultTextStyle>
+  <p:extLst>
+    <p:ext uri="{EFAFB233-063F-42B5-8137-9DF3F51BA10A}">
+      <p15:sldGuideLst xmlns:p15="http://schemas.microsoft.com/office/powerpoint/2012/main"/>
+    </p:ext>
+  </p:extLst>
 </p:presentation>
 </file>
 
@@ -254,7 +260,7 @@
           <a:p>
             <a:fld id="{32F1229E-AD93-C846-9B33-ECB536250035}" type="datetimeFigureOut">
               <a:rPr lang="en-US" smtClean="0"/>
-              <a:t>2/12/20</a:t>
+              <a:t>2/22/20</a:t>
             </a:fld>
             <a:endParaRPr lang="en-US"/>
           </a:p>
@@ -452,7 +458,7 @@
           <a:p>
             <a:fld id="{32F1229E-AD93-C846-9B33-ECB536250035}" type="datetimeFigureOut">
               <a:rPr lang="en-US" smtClean="0"/>
-              <a:t>2/12/20</a:t>
+              <a:t>2/22/20</a:t>
             </a:fld>
             <a:endParaRPr lang="en-US"/>
           </a:p>
@@ -660,7 +666,7 @@
           <a:p>
             <a:fld id="{32F1229E-AD93-C846-9B33-ECB536250035}" type="datetimeFigureOut">
               <a:rPr lang="en-US" smtClean="0"/>
-              <a:t>2/12/20</a:t>
+              <a:t>2/22/20</a:t>
             </a:fld>
             <a:endParaRPr lang="en-US"/>
           </a:p>
@@ -858,7 +864,7 @@
           <a:p>
             <a:fld id="{32F1229E-AD93-C846-9B33-ECB536250035}" type="datetimeFigureOut">
               <a:rPr lang="en-US" smtClean="0"/>
-              <a:t>2/12/20</a:t>
+              <a:t>2/22/20</a:t>
             </a:fld>
             <a:endParaRPr lang="en-US"/>
           </a:p>
@@ -1133,7 +1139,7 @@
           <a:p>
             <a:fld id="{32F1229E-AD93-C846-9B33-ECB536250035}" type="datetimeFigureOut">
               <a:rPr lang="en-US" smtClean="0"/>
-              <a:t>2/12/20</a:t>
+              <a:t>2/22/20</a:t>
             </a:fld>
             <a:endParaRPr lang="en-US"/>
           </a:p>
@@ -1398,7 +1404,7 @@
           <a:p>
             <a:fld id="{32F1229E-AD93-C846-9B33-ECB536250035}" type="datetimeFigureOut">
               <a:rPr lang="en-US" smtClean="0"/>
-              <a:t>2/12/20</a:t>
+              <a:t>2/22/20</a:t>
             </a:fld>
             <a:endParaRPr lang="en-US"/>
           </a:p>
@@ -1810,7 +1816,7 @@
           <a:p>
             <a:fld id="{32F1229E-AD93-C846-9B33-ECB536250035}" type="datetimeFigureOut">
               <a:rPr lang="en-US" smtClean="0"/>
-              <a:t>2/12/20</a:t>
+              <a:t>2/22/20</a:t>
             </a:fld>
             <a:endParaRPr lang="en-US"/>
           </a:p>
@@ -1951,7 +1957,7 @@
           <a:p>
             <a:fld id="{32F1229E-AD93-C846-9B33-ECB536250035}" type="datetimeFigureOut">
               <a:rPr lang="en-US" smtClean="0"/>
-              <a:t>2/12/20</a:t>
+              <a:t>2/22/20</a:t>
             </a:fld>
             <a:endParaRPr lang="en-US"/>
           </a:p>
@@ -2064,7 +2070,7 @@
           <a:p>
             <a:fld id="{32F1229E-AD93-C846-9B33-ECB536250035}" type="datetimeFigureOut">
               <a:rPr lang="en-US" smtClean="0"/>
-              <a:t>2/12/20</a:t>
+              <a:t>2/22/20</a:t>
             </a:fld>
             <a:endParaRPr lang="en-US"/>
           </a:p>
@@ -2375,7 +2381,7 @@
           <a:p>
             <a:fld id="{32F1229E-AD93-C846-9B33-ECB536250035}" type="datetimeFigureOut">
               <a:rPr lang="en-US" smtClean="0"/>
-              <a:t>2/12/20</a:t>
+              <a:t>2/22/20</a:t>
             </a:fld>
             <a:endParaRPr lang="en-US"/>
           </a:p>
@@ -2663,7 +2669,7 @@
           <a:p>
             <a:fld id="{32F1229E-AD93-C846-9B33-ECB536250035}" type="datetimeFigureOut">
               <a:rPr lang="en-US" smtClean="0"/>
-              <a:t>2/12/20</a:t>
+              <a:t>2/22/20</a:t>
             </a:fld>
             <a:endParaRPr lang="en-US"/>
           </a:p>
@@ -2904,7 +2910,7 @@
           <a:p>
             <a:fld id="{32F1229E-AD93-C846-9B33-ECB536250035}" type="datetimeFigureOut">
               <a:rPr lang="en-US" smtClean="0"/>
-              <a:t>2/12/20</a:t>
+              <a:t>2/22/20</a:t>
             </a:fld>
             <a:endParaRPr lang="en-US"/>
           </a:p>
@@ -5230,6 +5236,803 @@
 </p:sld>
 </file>
 
+<file path=ppt/slides/slide2.xml><?xml version="1.0" encoding="utf-8"?>
+<p:sld xmlns:a="http://schemas.openxmlformats.org/drawingml/2006/main" xmlns:r="http://schemas.openxmlformats.org/officeDocument/2006/relationships" xmlns:p="http://schemas.openxmlformats.org/presentationml/2006/main">
+  <p:cSld>
+    <p:spTree>
+      <p:nvGrpSpPr>
+        <p:cNvPr id="1" name=""/>
+        <p:cNvGrpSpPr/>
+        <p:nvPr/>
+      </p:nvGrpSpPr>
+      <p:grpSpPr>
+        <a:xfrm>
+          <a:off x="0" y="0"/>
+          <a:ext cx="0" cy="0"/>
+          <a:chOff x="0" y="0"/>
+          <a:chExt cx="0" cy="0"/>
+        </a:xfrm>
+      </p:grpSpPr>
+      <p:sp>
+        <p:nvSpPr>
+          <p:cNvPr id="17" name="Rectangle 16">
+            <a:extLst>
+              <a:ext uri="{FF2B5EF4-FFF2-40B4-BE49-F238E27FC236}">
+                <a16:creationId xmlns:a16="http://schemas.microsoft.com/office/drawing/2014/main" id="{CFD41376-8AAF-9F4F-BD75-823A24C3A44A}"/>
+              </a:ext>
+            </a:extLst>
+          </p:cNvPr>
+          <p:cNvSpPr/>
+          <p:nvPr/>
+        </p:nvSpPr>
+        <p:spPr>
+          <a:xfrm>
+            <a:off x="1173018" y="628073"/>
+            <a:ext cx="5200073" cy="2918691"/>
+          </a:xfrm>
+          <a:prstGeom prst="rect">
+            <a:avLst/>
+          </a:prstGeom>
+          <a:solidFill>
+            <a:schemeClr val="bg1"/>
+          </a:solidFill>
+          <a:ln>
+            <a:noFill/>
+          </a:ln>
+        </p:spPr>
+        <p:style>
+          <a:lnRef idx="2">
+            <a:schemeClr val="accent1">
+              <a:shade val="50000"/>
+            </a:schemeClr>
+          </a:lnRef>
+          <a:fillRef idx="1">
+            <a:schemeClr val="accent1"/>
+          </a:fillRef>
+          <a:effectRef idx="0">
+            <a:schemeClr val="accent1"/>
+          </a:effectRef>
+          <a:fontRef idx="minor">
+            <a:schemeClr val="lt1"/>
+          </a:fontRef>
+        </p:style>
+        <p:txBody>
+          <a:bodyPr rtlCol="0" anchor="ctr"/>
+          <a:lstStyle/>
+          <a:p>
+            <a:pPr algn="ctr"/>
+            <a:endParaRPr lang="en-US"/>
+          </a:p>
+        </p:txBody>
+      </p:sp>
+      <p:sp>
+        <p:nvSpPr>
+          <p:cNvPr id="7" name="Rectangle 6">
+            <a:extLst>
+              <a:ext uri="{FF2B5EF4-FFF2-40B4-BE49-F238E27FC236}">
+                <a16:creationId xmlns:a16="http://schemas.microsoft.com/office/drawing/2014/main" id="{F61E304D-FF9D-EF4E-877C-26D898F1809E}"/>
+              </a:ext>
+            </a:extLst>
+          </p:cNvPr>
+          <p:cNvSpPr/>
+          <p:nvPr/>
+        </p:nvSpPr>
+        <p:spPr>
+          <a:xfrm>
+            <a:off x="1573967" y="2098624"/>
+            <a:ext cx="1573967" cy="1154242"/>
+          </a:xfrm>
+          <a:prstGeom prst="rect">
+            <a:avLst/>
+          </a:prstGeom>
+          <a:solidFill>
+            <a:schemeClr val="accent6"/>
+          </a:solidFill>
+          <a:ln>
+            <a:noFill/>
+          </a:ln>
+        </p:spPr>
+        <p:style>
+          <a:lnRef idx="2">
+            <a:schemeClr val="accent1">
+              <a:shade val="50000"/>
+            </a:schemeClr>
+          </a:lnRef>
+          <a:fillRef idx="1">
+            <a:schemeClr val="accent1"/>
+          </a:fillRef>
+          <a:effectRef idx="0">
+            <a:schemeClr val="accent1"/>
+          </a:effectRef>
+          <a:fontRef idx="minor">
+            <a:schemeClr val="lt1"/>
+          </a:fontRef>
+        </p:style>
+        <p:txBody>
+          <a:bodyPr rtlCol="0" anchor="ctr"/>
+          <a:lstStyle/>
+          <a:p>
+            <a:pPr algn="ctr"/>
+            <a:endParaRPr lang="en-US"/>
+          </a:p>
+        </p:txBody>
+      </p:sp>
+      <p:sp>
+        <p:nvSpPr>
+          <p:cNvPr id="5" name="Snip Diagonal Corner Rectangle 4">
+            <a:extLst>
+              <a:ext uri="{FF2B5EF4-FFF2-40B4-BE49-F238E27FC236}">
+                <a16:creationId xmlns:a16="http://schemas.microsoft.com/office/drawing/2014/main" id="{78EB5A96-F289-6747-B993-B956E911ADC4}"/>
+              </a:ext>
+            </a:extLst>
+          </p:cNvPr>
+          <p:cNvSpPr/>
+          <p:nvPr/>
+        </p:nvSpPr>
+        <p:spPr>
+          <a:xfrm>
+            <a:off x="1573967" y="1469036"/>
+            <a:ext cx="1573967" cy="1274164"/>
+          </a:xfrm>
+          <a:prstGeom prst="snip2DiagRect">
+            <a:avLst>
+              <a:gd name="adj1" fmla="val 0"/>
+              <a:gd name="adj2" fmla="val 50000"/>
+            </a:avLst>
+          </a:prstGeom>
+          <a:ln>
+            <a:noFill/>
+          </a:ln>
+        </p:spPr>
+        <p:style>
+          <a:lnRef idx="2">
+            <a:schemeClr val="accent1">
+              <a:shade val="50000"/>
+            </a:schemeClr>
+          </a:lnRef>
+          <a:fillRef idx="1">
+            <a:schemeClr val="accent1"/>
+          </a:fillRef>
+          <a:effectRef idx="0">
+            <a:schemeClr val="accent1"/>
+          </a:effectRef>
+          <a:fontRef idx="minor">
+            <a:schemeClr val="lt1"/>
+          </a:fontRef>
+        </p:style>
+        <p:txBody>
+          <a:bodyPr rtlCol="0" anchor="ctr"/>
+          <a:lstStyle/>
+          <a:p>
+            <a:pPr algn="ctr"/>
+            <a:endParaRPr lang="en-US"/>
+          </a:p>
+        </p:txBody>
+      </p:sp>
+      <p:sp>
+        <p:nvSpPr>
+          <p:cNvPr id="6" name="Right Triangle 5">
+            <a:extLst>
+              <a:ext uri="{FF2B5EF4-FFF2-40B4-BE49-F238E27FC236}">
+                <a16:creationId xmlns:a16="http://schemas.microsoft.com/office/drawing/2014/main" id="{84CE8BF9-B24A-7D4C-ACD6-1468061728C3}"/>
+              </a:ext>
+            </a:extLst>
+          </p:cNvPr>
+          <p:cNvSpPr/>
+          <p:nvPr/>
+        </p:nvSpPr>
+        <p:spPr>
+          <a:xfrm rot="10800000">
+            <a:off x="2518348" y="1469035"/>
+            <a:ext cx="629586" cy="629588"/>
+          </a:xfrm>
+          <a:prstGeom prst="rtTriangle">
+            <a:avLst/>
+          </a:prstGeom>
+          <a:solidFill>
+            <a:schemeClr val="accent2"/>
+          </a:solidFill>
+          <a:ln>
+            <a:noFill/>
+          </a:ln>
+        </p:spPr>
+        <p:style>
+          <a:lnRef idx="2">
+            <a:schemeClr val="accent1">
+              <a:shade val="50000"/>
+            </a:schemeClr>
+          </a:lnRef>
+          <a:fillRef idx="1">
+            <a:schemeClr val="accent1"/>
+          </a:fillRef>
+          <a:effectRef idx="0">
+            <a:schemeClr val="accent1"/>
+          </a:effectRef>
+          <a:fontRef idx="minor">
+            <a:schemeClr val="lt1"/>
+          </a:fontRef>
+        </p:style>
+        <p:txBody>
+          <a:bodyPr rtlCol="0" anchor="ctr"/>
+          <a:lstStyle/>
+          <a:p>
+            <a:pPr algn="ctr"/>
+            <a:endParaRPr lang="en-US"/>
+          </a:p>
+        </p:txBody>
+      </p:sp>
+      <p:sp>
+        <p:nvSpPr>
+          <p:cNvPr id="8" name="Oval 7">
+            <a:extLst>
+              <a:ext uri="{FF2B5EF4-FFF2-40B4-BE49-F238E27FC236}">
+                <a16:creationId xmlns:a16="http://schemas.microsoft.com/office/drawing/2014/main" id="{666217DA-FF53-2245-A021-B0F3DC572640}"/>
+              </a:ext>
+            </a:extLst>
+          </p:cNvPr>
+          <p:cNvSpPr/>
+          <p:nvPr/>
+        </p:nvSpPr>
+        <p:spPr>
+          <a:xfrm>
+            <a:off x="1921163" y="3011054"/>
+            <a:ext cx="92363" cy="110836"/>
+          </a:xfrm>
+          <a:prstGeom prst="ellipse">
+            <a:avLst/>
+          </a:prstGeom>
+          <a:solidFill>
+            <a:schemeClr val="tx1"/>
+          </a:solidFill>
+          <a:ln>
+            <a:noFill/>
+          </a:ln>
+        </p:spPr>
+        <p:style>
+          <a:lnRef idx="2">
+            <a:schemeClr val="accent1">
+              <a:shade val="50000"/>
+            </a:schemeClr>
+          </a:lnRef>
+          <a:fillRef idx="1">
+            <a:schemeClr val="accent1"/>
+          </a:fillRef>
+          <a:effectRef idx="0">
+            <a:schemeClr val="accent1"/>
+          </a:effectRef>
+          <a:fontRef idx="minor">
+            <a:schemeClr val="lt1"/>
+          </a:fontRef>
+        </p:style>
+        <p:txBody>
+          <a:bodyPr rtlCol="0" anchor="ctr"/>
+          <a:lstStyle/>
+          <a:p>
+            <a:pPr algn="ctr"/>
+            <a:endParaRPr lang="en-US"/>
+          </a:p>
+        </p:txBody>
+      </p:sp>
+      <p:sp>
+        <p:nvSpPr>
+          <p:cNvPr id="9" name="Oval 8">
+            <a:extLst>
+              <a:ext uri="{FF2B5EF4-FFF2-40B4-BE49-F238E27FC236}">
+                <a16:creationId xmlns:a16="http://schemas.microsoft.com/office/drawing/2014/main" id="{7E51048B-7429-7F46-8C1E-2CA744D85E07}"/>
+              </a:ext>
+            </a:extLst>
+          </p:cNvPr>
+          <p:cNvSpPr/>
+          <p:nvPr/>
+        </p:nvSpPr>
+        <p:spPr>
+          <a:xfrm>
+            <a:off x="1981197" y="2050700"/>
+            <a:ext cx="92363" cy="110836"/>
+          </a:xfrm>
+          <a:prstGeom prst="ellipse">
+            <a:avLst/>
+          </a:prstGeom>
+          <a:solidFill>
+            <a:schemeClr val="tx1"/>
+          </a:solidFill>
+          <a:ln>
+            <a:noFill/>
+          </a:ln>
+        </p:spPr>
+        <p:style>
+          <a:lnRef idx="2">
+            <a:schemeClr val="accent1">
+              <a:shade val="50000"/>
+            </a:schemeClr>
+          </a:lnRef>
+          <a:fillRef idx="1">
+            <a:schemeClr val="accent1"/>
+          </a:fillRef>
+          <a:effectRef idx="0">
+            <a:schemeClr val="accent1"/>
+          </a:effectRef>
+          <a:fontRef idx="minor">
+            <a:schemeClr val="lt1"/>
+          </a:fontRef>
+        </p:style>
+        <p:txBody>
+          <a:bodyPr rtlCol="0" anchor="ctr"/>
+          <a:lstStyle/>
+          <a:p>
+            <a:pPr algn="ctr"/>
+            <a:endParaRPr lang="en-US"/>
+          </a:p>
+        </p:txBody>
+      </p:sp>
+      <p:sp>
+        <p:nvSpPr>
+          <p:cNvPr id="10" name="Oval 9">
+            <a:extLst>
+              <a:ext uri="{FF2B5EF4-FFF2-40B4-BE49-F238E27FC236}">
+                <a16:creationId xmlns:a16="http://schemas.microsoft.com/office/drawing/2014/main" id="{1D2E9FB9-509E-C641-A166-D2A96C67F5D0}"/>
+              </a:ext>
+            </a:extLst>
+          </p:cNvPr>
+          <p:cNvSpPr/>
+          <p:nvPr/>
+        </p:nvSpPr>
+        <p:spPr>
+          <a:xfrm>
+            <a:off x="2823902" y="1617575"/>
+            <a:ext cx="92363" cy="110836"/>
+          </a:xfrm>
+          <a:prstGeom prst="ellipse">
+            <a:avLst/>
+          </a:prstGeom>
+          <a:solidFill>
+            <a:schemeClr val="tx1"/>
+          </a:solidFill>
+          <a:ln>
+            <a:noFill/>
+          </a:ln>
+        </p:spPr>
+        <p:style>
+          <a:lnRef idx="2">
+            <a:schemeClr val="accent1">
+              <a:shade val="50000"/>
+            </a:schemeClr>
+          </a:lnRef>
+          <a:fillRef idx="1">
+            <a:schemeClr val="accent1"/>
+          </a:fillRef>
+          <a:effectRef idx="0">
+            <a:schemeClr val="accent1"/>
+          </a:effectRef>
+          <a:fontRef idx="minor">
+            <a:schemeClr val="lt1"/>
+          </a:fontRef>
+        </p:style>
+        <p:txBody>
+          <a:bodyPr rtlCol="0" anchor="ctr"/>
+          <a:lstStyle/>
+          <a:p>
+            <a:pPr algn="ctr"/>
+            <a:endParaRPr lang="en-US"/>
+          </a:p>
+        </p:txBody>
+      </p:sp>
+      <p:sp>
+        <p:nvSpPr>
+          <p:cNvPr id="11" name="TextBox 10">
+            <a:extLst>
+              <a:ext uri="{FF2B5EF4-FFF2-40B4-BE49-F238E27FC236}">
+                <a16:creationId xmlns:a16="http://schemas.microsoft.com/office/drawing/2014/main" id="{507A7B29-24E1-1A48-BCCF-8A30D8A98588}"/>
+              </a:ext>
+            </a:extLst>
+          </p:cNvPr>
+          <p:cNvSpPr txBox="1"/>
+          <p:nvPr/>
+        </p:nvSpPr>
+        <p:spPr>
+          <a:xfrm>
+            <a:off x="1967344" y="2828756"/>
+            <a:ext cx="303288" cy="338554"/>
+          </a:xfrm>
+          <a:prstGeom prst="rect">
+            <a:avLst/>
+          </a:prstGeom>
+          <a:noFill/>
+        </p:spPr>
+        <p:txBody>
+          <a:bodyPr wrap="none" rtlCol="0">
+            <a:spAutoFit/>
+          </a:bodyPr>
+          <a:lstStyle/>
+          <a:p>
+            <a:r>
+              <a:rPr lang="en-US" sz="1600" dirty="0"/>
+              <a:t>A</a:t>
+            </a:r>
+          </a:p>
+        </p:txBody>
+      </p:sp>
+      <p:sp>
+        <p:nvSpPr>
+          <p:cNvPr id="12" name="TextBox 11">
+            <a:extLst>
+              <a:ext uri="{FF2B5EF4-FFF2-40B4-BE49-F238E27FC236}">
+                <a16:creationId xmlns:a16="http://schemas.microsoft.com/office/drawing/2014/main" id="{D5FCE401-84C9-0742-B0D1-C681B9E487D9}"/>
+              </a:ext>
+            </a:extLst>
+          </p:cNvPr>
+          <p:cNvSpPr txBox="1"/>
+          <p:nvPr/>
+        </p:nvSpPr>
+        <p:spPr>
+          <a:xfrm>
+            <a:off x="2027378" y="2045505"/>
+            <a:ext cx="296876" cy="338554"/>
+          </a:xfrm>
+          <a:prstGeom prst="rect">
+            <a:avLst/>
+          </a:prstGeom>
+          <a:noFill/>
+        </p:spPr>
+        <p:txBody>
+          <a:bodyPr wrap="none" rtlCol="0">
+            <a:spAutoFit/>
+          </a:bodyPr>
+          <a:lstStyle/>
+          <a:p>
+            <a:r>
+              <a:rPr lang="en-US" sz="1600" dirty="0"/>
+              <a:t>B</a:t>
+            </a:r>
+          </a:p>
+        </p:txBody>
+      </p:sp>
+      <p:sp>
+        <p:nvSpPr>
+          <p:cNvPr id="13" name="TextBox 12">
+            <a:extLst>
+              <a:ext uri="{FF2B5EF4-FFF2-40B4-BE49-F238E27FC236}">
+                <a16:creationId xmlns:a16="http://schemas.microsoft.com/office/drawing/2014/main" id="{74E2F51E-AA96-3B49-A8D5-33BEFE9D45B0}"/>
+              </a:ext>
+            </a:extLst>
+          </p:cNvPr>
+          <p:cNvSpPr txBox="1"/>
+          <p:nvPr/>
+        </p:nvSpPr>
+        <p:spPr>
+          <a:xfrm>
+            <a:off x="2870083" y="1612608"/>
+            <a:ext cx="296876" cy="338554"/>
+          </a:xfrm>
+          <a:prstGeom prst="rect">
+            <a:avLst/>
+          </a:prstGeom>
+          <a:noFill/>
+        </p:spPr>
+        <p:txBody>
+          <a:bodyPr wrap="none" rtlCol="0">
+            <a:spAutoFit/>
+          </a:bodyPr>
+          <a:lstStyle/>
+          <a:p>
+            <a:r>
+              <a:rPr lang="en-US" sz="1600" dirty="0"/>
+              <a:t>C</a:t>
+            </a:r>
+          </a:p>
+        </p:txBody>
+      </p:sp>
+      <p:graphicFrame>
+        <p:nvGraphicFramePr>
+          <p:cNvPr id="14" name="Table 13">
+            <a:extLst>
+              <a:ext uri="{FF2B5EF4-FFF2-40B4-BE49-F238E27FC236}">
+                <a16:creationId xmlns:a16="http://schemas.microsoft.com/office/drawing/2014/main" id="{1F401692-A5E3-DB4B-BFDC-682CC4806ACB}"/>
+              </a:ext>
+            </a:extLst>
+          </p:cNvPr>
+          <p:cNvGraphicFramePr>
+            <a:graphicFrameLocks noGrp="1"/>
+          </p:cNvGraphicFramePr>
+          <p:nvPr>
+            <p:extLst>
+              <p:ext uri="{D42A27DB-BD31-4B8C-83A1-F6EECF244321}">
+                <p14:modId xmlns:p14="http://schemas.microsoft.com/office/powerpoint/2010/main" val="4120943453"/>
+              </p:ext>
+            </p:extLst>
+          </p:nvPr>
+        </p:nvGraphicFramePr>
+        <p:xfrm>
+          <a:off x="4092314" y="1469035"/>
+          <a:ext cx="1908742" cy="1483360"/>
+        </p:xfrm>
+        <a:graphic>
+          <a:graphicData uri="http://schemas.openxmlformats.org/drawingml/2006/table">
+            <a:tbl>
+              <a:tblPr firstRow="1" bandRow="1">
+                <a:tableStyleId>{E8034E78-7F5D-4C2E-B375-FC64B27BC917}</a:tableStyleId>
+              </a:tblPr>
+              <a:tblGrid>
+                <a:gridCol w="954371">
+                  <a:extLst>
+                    <a:ext uri="{9D8B030D-6E8A-4147-A177-3AD203B41FA5}">
+                      <a16:colId xmlns:a16="http://schemas.microsoft.com/office/drawing/2014/main" val="2051849372"/>
+                    </a:ext>
+                  </a:extLst>
+                </a:gridCol>
+                <a:gridCol w="954371">
+                  <a:extLst>
+                    <a:ext uri="{9D8B030D-6E8A-4147-A177-3AD203B41FA5}">
+                      <a16:colId xmlns:a16="http://schemas.microsoft.com/office/drawing/2014/main" val="3674199074"/>
+                    </a:ext>
+                  </a:extLst>
+                </a:gridCol>
+              </a:tblGrid>
+              <a:tr h="370840">
+                <a:tc>
+                  <a:txBody>
+                    <a:bodyPr/>
+                    <a:lstStyle/>
+                    <a:p>
+                      <a:pPr algn="ctr"/>
+                      <a:r>
+                        <a:rPr lang="en-US" dirty="0"/>
+                        <a:t>Point</a:t>
+                      </a:r>
+                    </a:p>
+                  </a:txBody>
+                  <a:tcPr/>
+                </a:tc>
+                <a:tc>
+                  <a:txBody>
+                    <a:bodyPr/>
+                    <a:lstStyle/>
+                    <a:p>
+                      <a:pPr algn="ctr"/>
+                      <a:r>
+                        <a:rPr lang="en-US" dirty="0"/>
+                        <a:t>Color</a:t>
+                      </a:r>
+                    </a:p>
+                  </a:txBody>
+                  <a:tcPr/>
+                </a:tc>
+                <a:extLst>
+                  <a:ext uri="{0D108BD9-81ED-4DB2-BD59-A6C34878D82A}">
+                    <a16:rowId xmlns:a16="http://schemas.microsoft.com/office/drawing/2014/main" val="1672634063"/>
+                  </a:ext>
+                </a:extLst>
+              </a:tr>
+              <a:tr h="370840">
+                <a:tc>
+                  <a:txBody>
+                    <a:bodyPr/>
+                    <a:lstStyle/>
+                    <a:p>
+                      <a:pPr algn="ctr"/>
+                      <a:r>
+                        <a:rPr lang="en-US" dirty="0">
+                          <a:solidFill>
+                            <a:schemeClr val="tx1"/>
+                          </a:solidFill>
+                        </a:rPr>
+                        <a:t>A</a:t>
+                      </a:r>
+                    </a:p>
+                  </a:txBody>
+                  <a:tcPr/>
+                </a:tc>
+                <a:tc>
+                  <a:txBody>
+                    <a:bodyPr/>
+                    <a:lstStyle/>
+                    <a:p>
+                      <a:pPr algn="ctr"/>
+                      <a:r>
+                        <a:rPr lang="en-US" dirty="0">
+                          <a:solidFill>
+                            <a:schemeClr val="tx1"/>
+                          </a:solidFill>
+                        </a:rPr>
+                        <a:t>green</a:t>
+                      </a:r>
+                    </a:p>
+                  </a:txBody>
+                  <a:tcPr/>
+                </a:tc>
+                <a:extLst>
+                  <a:ext uri="{0D108BD9-81ED-4DB2-BD59-A6C34878D82A}">
+                    <a16:rowId xmlns:a16="http://schemas.microsoft.com/office/drawing/2014/main" val="2677518176"/>
+                  </a:ext>
+                </a:extLst>
+              </a:tr>
+              <a:tr h="370840">
+                <a:tc>
+                  <a:txBody>
+                    <a:bodyPr/>
+                    <a:lstStyle/>
+                    <a:p>
+                      <a:pPr algn="ctr"/>
+                      <a:r>
+                        <a:rPr lang="en-US" dirty="0">
+                          <a:solidFill>
+                            <a:schemeClr val="tx1"/>
+                          </a:solidFill>
+                        </a:rPr>
+                        <a:t>B</a:t>
+                      </a:r>
+                    </a:p>
+                  </a:txBody>
+                  <a:tcPr/>
+                </a:tc>
+                <a:tc>
+                  <a:txBody>
+                    <a:bodyPr/>
+                    <a:lstStyle/>
+                    <a:p>
+                      <a:pPr algn="ctr"/>
+                      <a:r>
+                        <a:rPr lang="en-US" dirty="0">
+                          <a:solidFill>
+                            <a:schemeClr val="tx1"/>
+                          </a:solidFill>
+                        </a:rPr>
+                        <a:t>blue</a:t>
+                      </a:r>
+                    </a:p>
+                  </a:txBody>
+                  <a:tcPr/>
+                </a:tc>
+                <a:extLst>
+                  <a:ext uri="{0D108BD9-81ED-4DB2-BD59-A6C34878D82A}">
+                    <a16:rowId xmlns:a16="http://schemas.microsoft.com/office/drawing/2014/main" val="3653174156"/>
+                  </a:ext>
+                </a:extLst>
+              </a:tr>
+              <a:tr h="370840">
+                <a:tc>
+                  <a:txBody>
+                    <a:bodyPr/>
+                    <a:lstStyle/>
+                    <a:p>
+                      <a:pPr algn="ctr"/>
+                      <a:r>
+                        <a:rPr lang="en-US" dirty="0">
+                          <a:solidFill>
+                            <a:schemeClr val="tx1"/>
+                          </a:solidFill>
+                        </a:rPr>
+                        <a:t>C</a:t>
+                      </a:r>
+                    </a:p>
+                  </a:txBody>
+                  <a:tcPr/>
+                </a:tc>
+                <a:tc>
+                  <a:txBody>
+                    <a:bodyPr/>
+                    <a:lstStyle/>
+                    <a:p>
+                      <a:pPr algn="ctr"/>
+                      <a:r>
+                        <a:rPr lang="en-US" dirty="0">
+                          <a:solidFill>
+                            <a:schemeClr val="tx1"/>
+                          </a:solidFill>
+                        </a:rPr>
+                        <a:t>orange</a:t>
+                      </a:r>
+                    </a:p>
+                  </a:txBody>
+                  <a:tcPr/>
+                </a:tc>
+                <a:extLst>
+                  <a:ext uri="{0D108BD9-81ED-4DB2-BD59-A6C34878D82A}">
+                    <a16:rowId xmlns:a16="http://schemas.microsoft.com/office/drawing/2014/main" val="2593157452"/>
+                  </a:ext>
+                </a:extLst>
+              </a:tr>
+            </a:tbl>
+          </a:graphicData>
+        </a:graphic>
+      </p:graphicFrame>
+      <p:sp>
+        <p:nvSpPr>
+          <p:cNvPr id="15" name="TextBox 14">
+            <a:extLst>
+              <a:ext uri="{FF2B5EF4-FFF2-40B4-BE49-F238E27FC236}">
+                <a16:creationId xmlns:a16="http://schemas.microsoft.com/office/drawing/2014/main" id="{E63C5EA1-6B17-C047-BE3D-420CE099CDBE}"/>
+              </a:ext>
+            </a:extLst>
+          </p:cNvPr>
+          <p:cNvSpPr txBox="1"/>
+          <p:nvPr/>
+        </p:nvSpPr>
+        <p:spPr>
+          <a:xfrm>
+            <a:off x="1477310" y="798704"/>
+            <a:ext cx="1767279" cy="584775"/>
+          </a:xfrm>
+          <a:prstGeom prst="rect">
+            <a:avLst/>
+          </a:prstGeom>
+          <a:noFill/>
+        </p:spPr>
+        <p:txBody>
+          <a:bodyPr wrap="none" rtlCol="0">
+            <a:spAutoFit/>
+          </a:bodyPr>
+          <a:lstStyle/>
+          <a:p>
+            <a:pPr algn="ctr"/>
+            <a:r>
+              <a:rPr lang="en-US" sz="1600" dirty="0"/>
+              <a:t>Spatial datasets</a:t>
+            </a:r>
+          </a:p>
+          <a:p>
+            <a:pPr algn="ctr"/>
+            <a:r>
+              <a:rPr lang="en-US" sz="1600" dirty="0"/>
+              <a:t>(points + polygons)</a:t>
+            </a:r>
+          </a:p>
+        </p:txBody>
+      </p:sp>
+      <p:sp>
+        <p:nvSpPr>
+          <p:cNvPr id="16" name="TextBox 15">
+            <a:extLst>
+              <a:ext uri="{FF2B5EF4-FFF2-40B4-BE49-F238E27FC236}">
+                <a16:creationId xmlns:a16="http://schemas.microsoft.com/office/drawing/2014/main" id="{2A7B4B3A-3F13-3449-B43F-944DB25F6664}"/>
+              </a:ext>
+            </a:extLst>
+          </p:cNvPr>
+          <p:cNvSpPr txBox="1"/>
+          <p:nvPr/>
+        </p:nvSpPr>
+        <p:spPr>
+          <a:xfrm>
+            <a:off x="4118709" y="834437"/>
+            <a:ext cx="1855957" cy="338554"/>
+          </a:xfrm>
+          <a:prstGeom prst="rect">
+            <a:avLst/>
+          </a:prstGeom>
+          <a:noFill/>
+        </p:spPr>
+        <p:txBody>
+          <a:bodyPr wrap="none" rtlCol="0">
+            <a:spAutoFit/>
+          </a:bodyPr>
+          <a:lstStyle/>
+          <a:p>
+            <a:pPr algn="ctr"/>
+            <a:r>
+              <a:rPr lang="en-US" sz="1600" dirty="0"/>
+              <a:t>Resulting </a:t>
+            </a:r>
+            <a:r>
+              <a:rPr lang="en-US" sz="1600" dirty="0" err="1"/>
+              <a:t>dataframe</a:t>
+            </a:r>
+            <a:endParaRPr lang="en-US" sz="1600" dirty="0"/>
+          </a:p>
+        </p:txBody>
+      </p:sp>
+    </p:spTree>
+    <p:extLst>
+      <p:ext uri="{BB962C8B-B14F-4D97-AF65-F5344CB8AC3E}">
+        <p14:creationId xmlns:p14="http://schemas.microsoft.com/office/powerpoint/2010/main" val="696190758"/>
+      </p:ext>
+    </p:extLst>
+  </p:cSld>
+  <p:clrMapOvr>
+    <a:masterClrMapping/>
+  </p:clrMapOvr>
+</p:sld>
+</file>
+
 <file path=ppt/theme/theme1.xml><?xml version="1.0" encoding="utf-8"?>
 <a:theme xmlns:a="http://schemas.openxmlformats.org/drawingml/2006/main" name="Office Theme">
   <a:themeElements>

</xml_diff>

<commit_message>
dummy variable post and add mathjax capability
</commit_message>
<xml_diff>
--- a/content/img/blog-images.pptx
+++ b/content/img/blog-images.pptx
@@ -7,6 +7,7 @@
   <p:sldIdLst>
     <p:sldId id="256" r:id="rId2"/>
     <p:sldId id="257" r:id="rId3"/>
+    <p:sldId id="258" r:id="rId4"/>
   </p:sldIdLst>
   <p:sldSz cx="12192000" cy="6858000"/>
   <p:notesSz cx="6858000" cy="9144000"/>
@@ -260,7 +261,7 @@
           <a:p>
             <a:fld id="{32F1229E-AD93-C846-9B33-ECB536250035}" type="datetimeFigureOut">
               <a:rPr lang="en-US" smtClean="0"/>
-              <a:t>2/22/20</a:t>
+              <a:t>2/4/21</a:t>
             </a:fld>
             <a:endParaRPr lang="en-US"/>
           </a:p>
@@ -458,7 +459,7 @@
           <a:p>
             <a:fld id="{32F1229E-AD93-C846-9B33-ECB536250035}" type="datetimeFigureOut">
               <a:rPr lang="en-US" smtClean="0"/>
-              <a:t>2/22/20</a:t>
+              <a:t>2/4/21</a:t>
             </a:fld>
             <a:endParaRPr lang="en-US"/>
           </a:p>
@@ -666,7 +667,7 @@
           <a:p>
             <a:fld id="{32F1229E-AD93-C846-9B33-ECB536250035}" type="datetimeFigureOut">
               <a:rPr lang="en-US" smtClean="0"/>
-              <a:t>2/22/20</a:t>
+              <a:t>2/4/21</a:t>
             </a:fld>
             <a:endParaRPr lang="en-US"/>
           </a:p>
@@ -864,7 +865,7 @@
           <a:p>
             <a:fld id="{32F1229E-AD93-C846-9B33-ECB536250035}" type="datetimeFigureOut">
               <a:rPr lang="en-US" smtClean="0"/>
-              <a:t>2/22/20</a:t>
+              <a:t>2/4/21</a:t>
             </a:fld>
             <a:endParaRPr lang="en-US"/>
           </a:p>
@@ -1139,7 +1140,7 @@
           <a:p>
             <a:fld id="{32F1229E-AD93-C846-9B33-ECB536250035}" type="datetimeFigureOut">
               <a:rPr lang="en-US" smtClean="0"/>
-              <a:t>2/22/20</a:t>
+              <a:t>2/4/21</a:t>
             </a:fld>
             <a:endParaRPr lang="en-US"/>
           </a:p>
@@ -1404,7 +1405,7 @@
           <a:p>
             <a:fld id="{32F1229E-AD93-C846-9B33-ECB536250035}" type="datetimeFigureOut">
               <a:rPr lang="en-US" smtClean="0"/>
-              <a:t>2/22/20</a:t>
+              <a:t>2/4/21</a:t>
             </a:fld>
             <a:endParaRPr lang="en-US"/>
           </a:p>
@@ -1816,7 +1817,7 @@
           <a:p>
             <a:fld id="{32F1229E-AD93-C846-9B33-ECB536250035}" type="datetimeFigureOut">
               <a:rPr lang="en-US" smtClean="0"/>
-              <a:t>2/22/20</a:t>
+              <a:t>2/4/21</a:t>
             </a:fld>
             <a:endParaRPr lang="en-US"/>
           </a:p>
@@ -1957,7 +1958,7 @@
           <a:p>
             <a:fld id="{32F1229E-AD93-C846-9B33-ECB536250035}" type="datetimeFigureOut">
               <a:rPr lang="en-US" smtClean="0"/>
-              <a:t>2/22/20</a:t>
+              <a:t>2/4/21</a:t>
             </a:fld>
             <a:endParaRPr lang="en-US"/>
           </a:p>
@@ -2070,7 +2071,7 @@
           <a:p>
             <a:fld id="{32F1229E-AD93-C846-9B33-ECB536250035}" type="datetimeFigureOut">
               <a:rPr lang="en-US" smtClean="0"/>
-              <a:t>2/22/20</a:t>
+              <a:t>2/4/21</a:t>
             </a:fld>
             <a:endParaRPr lang="en-US"/>
           </a:p>
@@ -2381,7 +2382,7 @@
           <a:p>
             <a:fld id="{32F1229E-AD93-C846-9B33-ECB536250035}" type="datetimeFigureOut">
               <a:rPr lang="en-US" smtClean="0"/>
-              <a:t>2/22/20</a:t>
+              <a:t>2/4/21</a:t>
             </a:fld>
             <a:endParaRPr lang="en-US"/>
           </a:p>
@@ -2669,7 +2670,7 @@
           <a:p>
             <a:fld id="{32F1229E-AD93-C846-9B33-ECB536250035}" type="datetimeFigureOut">
               <a:rPr lang="en-US" smtClean="0"/>
-              <a:t>2/22/20</a:t>
+              <a:t>2/4/21</a:t>
             </a:fld>
             <a:endParaRPr lang="en-US"/>
           </a:p>
@@ -2910,7 +2911,7 @@
           <a:p>
             <a:fld id="{32F1229E-AD93-C846-9B33-ECB536250035}" type="datetimeFigureOut">
               <a:rPr lang="en-US" smtClean="0"/>
-              <a:t>2/22/20</a:t>
+              <a:t>2/4/21</a:t>
             </a:fld>
             <a:endParaRPr lang="en-US"/>
           </a:p>
@@ -6033,6 +6034,2819 @@
 </p:sld>
 </file>
 
+<file path=ppt/slides/slide3.xml><?xml version="1.0" encoding="utf-8"?>
+<p:sld xmlns:a="http://schemas.openxmlformats.org/drawingml/2006/main" xmlns:r="http://schemas.openxmlformats.org/officeDocument/2006/relationships" xmlns:p="http://schemas.openxmlformats.org/presentationml/2006/main">
+  <p:cSld>
+    <p:spTree>
+      <p:nvGrpSpPr>
+        <p:cNvPr id="1" name=""/>
+        <p:cNvGrpSpPr/>
+        <p:nvPr/>
+      </p:nvGrpSpPr>
+      <p:grpSpPr>
+        <a:xfrm>
+          <a:off x="0" y="0"/>
+          <a:ext cx="0" cy="0"/>
+          <a:chOff x="0" y="0"/>
+          <a:chExt cx="0" cy="0"/>
+        </a:xfrm>
+      </p:grpSpPr>
+      <p:sp>
+        <p:nvSpPr>
+          <p:cNvPr id="6" name="Rectangle 5">
+            <a:extLst>
+              <a:ext uri="{FF2B5EF4-FFF2-40B4-BE49-F238E27FC236}">
+                <a16:creationId xmlns:a16="http://schemas.microsoft.com/office/drawing/2014/main" id="{785BBCF9-59A3-4944-B2EE-F002B1B0BF0A}"/>
+              </a:ext>
+            </a:extLst>
+          </p:cNvPr>
+          <p:cNvSpPr/>
+          <p:nvPr/>
+        </p:nvSpPr>
+        <p:spPr>
+          <a:xfrm>
+            <a:off x="1692876" y="963826"/>
+            <a:ext cx="8454768" cy="4188941"/>
+          </a:xfrm>
+          <a:prstGeom prst="rect">
+            <a:avLst/>
+          </a:prstGeom>
+          <a:solidFill>
+            <a:schemeClr val="bg1">
+              <a:lumMod val="95000"/>
+            </a:schemeClr>
+          </a:solidFill>
+          <a:ln>
+            <a:noFill/>
+          </a:ln>
+        </p:spPr>
+        <p:style>
+          <a:lnRef idx="2">
+            <a:schemeClr val="accent1">
+              <a:shade val="50000"/>
+            </a:schemeClr>
+          </a:lnRef>
+          <a:fillRef idx="1">
+            <a:schemeClr val="accent1"/>
+          </a:fillRef>
+          <a:effectRef idx="0">
+            <a:schemeClr val="accent1"/>
+          </a:effectRef>
+          <a:fontRef idx="minor">
+            <a:schemeClr val="lt1"/>
+          </a:fontRef>
+        </p:style>
+        <p:txBody>
+          <a:bodyPr rtlCol="0" anchor="ctr"/>
+          <a:lstStyle/>
+          <a:p>
+            <a:pPr algn="ctr"/>
+            <a:endParaRPr lang="en-US"/>
+          </a:p>
+        </p:txBody>
+      </p:sp>
+      <p:graphicFrame>
+        <p:nvGraphicFramePr>
+          <p:cNvPr id="4" name="Table 4">
+            <a:extLst>
+              <a:ext uri="{FF2B5EF4-FFF2-40B4-BE49-F238E27FC236}">
+                <a16:creationId xmlns:a16="http://schemas.microsoft.com/office/drawing/2014/main" id="{D915C151-BE99-4C44-AC2F-5653581151BB}"/>
+              </a:ext>
+            </a:extLst>
+          </p:cNvPr>
+          <p:cNvGraphicFramePr>
+            <a:graphicFrameLocks noGrp="1"/>
+          </p:cNvGraphicFramePr>
+          <p:nvPr>
+            <p:extLst>
+              <p:ext uri="{D42A27DB-BD31-4B8C-83A1-F6EECF244321}">
+                <p14:modId xmlns:p14="http://schemas.microsoft.com/office/powerpoint/2010/main" val="3369699480"/>
+              </p:ext>
+            </p:extLst>
+          </p:nvPr>
+        </p:nvGraphicFramePr>
+        <p:xfrm>
+          <a:off x="2044356" y="1439332"/>
+          <a:ext cx="2441146" cy="2595880"/>
+        </p:xfrm>
+        <a:graphic>
+          <a:graphicData uri="http://schemas.openxmlformats.org/drawingml/2006/table">
+            <a:tbl>
+              <a:tblPr firstRow="1" bandRow="1">
+                <a:tableStyleId>{5C22544A-7EE6-4342-B048-85BDC9FD1C3A}</a:tableStyleId>
+              </a:tblPr>
+              <a:tblGrid>
+                <a:gridCol w="1220573">
+                  <a:extLst>
+                    <a:ext uri="{9D8B030D-6E8A-4147-A177-3AD203B41FA5}">
+                      <a16:colId xmlns:a16="http://schemas.microsoft.com/office/drawing/2014/main" val="1774196152"/>
+                    </a:ext>
+                  </a:extLst>
+                </a:gridCol>
+                <a:gridCol w="1220573">
+                  <a:extLst>
+                    <a:ext uri="{9D8B030D-6E8A-4147-A177-3AD203B41FA5}">
+                      <a16:colId xmlns:a16="http://schemas.microsoft.com/office/drawing/2014/main" val="1058374735"/>
+                    </a:ext>
+                  </a:extLst>
+                </a:gridCol>
+              </a:tblGrid>
+              <a:tr h="370840">
+                <a:tc>
+                  <a:txBody>
+                    <a:bodyPr/>
+                    <a:lstStyle/>
+                    <a:p>
+                      <a:r>
+                        <a:rPr lang="en-US" dirty="0" err="1">
+                          <a:solidFill>
+                            <a:sysClr val="windowText" lastClr="000000"/>
+                          </a:solidFill>
+                        </a:rPr>
+                        <a:t>crop_type</a:t>
+                      </a:r>
+                      <a:endParaRPr lang="en-US" dirty="0">
+                        <a:solidFill>
+                          <a:sysClr val="windowText" lastClr="000000"/>
+                        </a:solidFill>
+                      </a:endParaRPr>
+                    </a:p>
+                  </a:txBody>
+                  <a:tcPr>
+                    <a:lnL w="12700" cap="flat" cmpd="sng" algn="ctr">
+                      <a:solidFill>
+                        <a:schemeClr val="tx1"/>
+                      </a:solidFill>
+                      <a:prstDash val="solid"/>
+                      <a:round/>
+                      <a:headEnd type="none" w="med" len="med"/>
+                      <a:tailEnd type="none" w="med" len="med"/>
+                    </a:lnL>
+                    <a:lnR w="12700" cap="flat" cmpd="sng" algn="ctr">
+                      <a:solidFill>
+                        <a:schemeClr val="tx1"/>
+                      </a:solidFill>
+                      <a:prstDash val="solid"/>
+                      <a:round/>
+                      <a:headEnd type="none" w="med" len="med"/>
+                      <a:tailEnd type="none" w="med" len="med"/>
+                    </a:lnR>
+                    <a:lnT w="12700" cap="flat" cmpd="sng" algn="ctr">
+                      <a:solidFill>
+                        <a:schemeClr val="tx1"/>
+                      </a:solidFill>
+                      <a:prstDash val="solid"/>
+                      <a:round/>
+                      <a:headEnd type="none" w="med" len="med"/>
+                      <a:tailEnd type="none" w="med" len="med"/>
+                    </a:lnT>
+                    <a:lnB w="12700" cap="flat" cmpd="sng" algn="ctr">
+                      <a:solidFill>
+                        <a:schemeClr val="tx1"/>
+                      </a:solidFill>
+                      <a:prstDash val="solid"/>
+                      <a:round/>
+                      <a:headEnd type="none" w="med" len="med"/>
+                      <a:tailEnd type="none" w="med" len="med"/>
+                    </a:lnB>
+                    <a:solidFill>
+                      <a:schemeClr val="bg1"/>
+                    </a:solidFill>
+                  </a:tcPr>
+                </a:tc>
+                <a:tc>
+                  <a:txBody>
+                    <a:bodyPr/>
+                    <a:lstStyle/>
+                    <a:p>
+                      <a:r>
+                        <a:rPr lang="en-US" dirty="0" err="1">
+                          <a:solidFill>
+                            <a:sysClr val="windowText" lastClr="000000"/>
+                          </a:solidFill>
+                        </a:rPr>
+                        <a:t>perc_N</a:t>
+                      </a:r>
+                      <a:endParaRPr lang="en-US" dirty="0">
+                        <a:solidFill>
+                          <a:sysClr val="windowText" lastClr="000000"/>
+                        </a:solidFill>
+                      </a:endParaRPr>
+                    </a:p>
+                  </a:txBody>
+                  <a:tcPr>
+                    <a:lnL w="12700" cap="flat" cmpd="sng" algn="ctr">
+                      <a:solidFill>
+                        <a:schemeClr val="tx1"/>
+                      </a:solidFill>
+                      <a:prstDash val="solid"/>
+                      <a:round/>
+                      <a:headEnd type="none" w="med" len="med"/>
+                      <a:tailEnd type="none" w="med" len="med"/>
+                    </a:lnL>
+                    <a:lnR w="12700" cap="flat" cmpd="sng" algn="ctr">
+                      <a:solidFill>
+                        <a:schemeClr val="tx1"/>
+                      </a:solidFill>
+                      <a:prstDash val="solid"/>
+                      <a:round/>
+                      <a:headEnd type="none" w="med" len="med"/>
+                      <a:tailEnd type="none" w="med" len="med"/>
+                    </a:lnR>
+                    <a:lnT w="12700" cap="flat" cmpd="sng" algn="ctr">
+                      <a:solidFill>
+                        <a:schemeClr val="tx1"/>
+                      </a:solidFill>
+                      <a:prstDash val="solid"/>
+                      <a:round/>
+                      <a:headEnd type="none" w="med" len="med"/>
+                      <a:tailEnd type="none" w="med" len="med"/>
+                    </a:lnT>
+                    <a:lnB w="12700" cap="flat" cmpd="sng" algn="ctr">
+                      <a:solidFill>
+                        <a:schemeClr val="tx1"/>
+                      </a:solidFill>
+                      <a:prstDash val="solid"/>
+                      <a:round/>
+                      <a:headEnd type="none" w="med" len="med"/>
+                      <a:tailEnd type="none" w="med" len="med"/>
+                    </a:lnB>
+                    <a:solidFill>
+                      <a:schemeClr val="bg1"/>
+                    </a:solidFill>
+                  </a:tcPr>
+                </a:tc>
+                <a:extLst>
+                  <a:ext uri="{0D108BD9-81ED-4DB2-BD59-A6C34878D82A}">
+                    <a16:rowId xmlns:a16="http://schemas.microsoft.com/office/drawing/2014/main" val="2982465084"/>
+                  </a:ext>
+                </a:extLst>
+              </a:tr>
+              <a:tr h="370840">
+                <a:tc>
+                  <a:txBody>
+                    <a:bodyPr/>
+                    <a:lstStyle/>
+                    <a:p>
+                      <a:r>
+                        <a:rPr lang="en-US" dirty="0">
+                          <a:solidFill>
+                            <a:sysClr val="windowText" lastClr="000000"/>
+                          </a:solidFill>
+                        </a:rPr>
+                        <a:t>corn</a:t>
+                      </a:r>
+                    </a:p>
+                  </a:txBody>
+                  <a:tcPr>
+                    <a:lnL w="12700" cap="flat" cmpd="sng" algn="ctr">
+                      <a:solidFill>
+                        <a:schemeClr val="tx1"/>
+                      </a:solidFill>
+                      <a:prstDash val="solid"/>
+                      <a:round/>
+                      <a:headEnd type="none" w="med" len="med"/>
+                      <a:tailEnd type="none" w="med" len="med"/>
+                    </a:lnL>
+                    <a:lnR w="12700" cap="flat" cmpd="sng" algn="ctr">
+                      <a:solidFill>
+                        <a:schemeClr val="tx1"/>
+                      </a:solidFill>
+                      <a:prstDash val="solid"/>
+                      <a:round/>
+                      <a:headEnd type="none" w="med" len="med"/>
+                      <a:tailEnd type="none" w="med" len="med"/>
+                    </a:lnR>
+                    <a:lnT w="12700" cap="flat" cmpd="sng" algn="ctr">
+                      <a:solidFill>
+                        <a:schemeClr val="tx1"/>
+                      </a:solidFill>
+                      <a:prstDash val="solid"/>
+                      <a:round/>
+                      <a:headEnd type="none" w="med" len="med"/>
+                      <a:tailEnd type="none" w="med" len="med"/>
+                    </a:lnT>
+                    <a:lnB w="12700" cap="flat" cmpd="sng" algn="ctr">
+                      <a:solidFill>
+                        <a:schemeClr val="tx1"/>
+                      </a:solidFill>
+                      <a:prstDash val="solid"/>
+                      <a:round/>
+                      <a:headEnd type="none" w="med" len="med"/>
+                      <a:tailEnd type="none" w="med" len="med"/>
+                    </a:lnB>
+                    <a:solidFill>
+                      <a:schemeClr val="bg1"/>
+                    </a:solidFill>
+                  </a:tcPr>
+                </a:tc>
+                <a:tc>
+                  <a:txBody>
+                    <a:bodyPr/>
+                    <a:lstStyle/>
+                    <a:p>
+                      <a:r>
+                        <a:rPr lang="en-US" dirty="0">
+                          <a:solidFill>
+                            <a:sysClr val="windowText" lastClr="000000"/>
+                          </a:solidFill>
+                        </a:rPr>
+                        <a:t>0.67</a:t>
+                      </a:r>
+                    </a:p>
+                  </a:txBody>
+                  <a:tcPr>
+                    <a:lnL w="12700" cap="flat" cmpd="sng" algn="ctr">
+                      <a:solidFill>
+                        <a:schemeClr val="tx1"/>
+                      </a:solidFill>
+                      <a:prstDash val="solid"/>
+                      <a:round/>
+                      <a:headEnd type="none" w="med" len="med"/>
+                      <a:tailEnd type="none" w="med" len="med"/>
+                    </a:lnL>
+                    <a:lnR w="12700" cap="flat" cmpd="sng" algn="ctr">
+                      <a:solidFill>
+                        <a:schemeClr val="tx1"/>
+                      </a:solidFill>
+                      <a:prstDash val="solid"/>
+                      <a:round/>
+                      <a:headEnd type="none" w="med" len="med"/>
+                      <a:tailEnd type="none" w="med" len="med"/>
+                    </a:lnR>
+                    <a:lnT w="12700" cap="flat" cmpd="sng" algn="ctr">
+                      <a:solidFill>
+                        <a:schemeClr val="tx1"/>
+                      </a:solidFill>
+                      <a:prstDash val="solid"/>
+                      <a:round/>
+                      <a:headEnd type="none" w="med" len="med"/>
+                      <a:tailEnd type="none" w="med" len="med"/>
+                    </a:lnT>
+                    <a:lnB w="12700" cap="flat" cmpd="sng" algn="ctr">
+                      <a:solidFill>
+                        <a:schemeClr val="tx1"/>
+                      </a:solidFill>
+                      <a:prstDash val="solid"/>
+                      <a:round/>
+                      <a:headEnd type="none" w="med" len="med"/>
+                      <a:tailEnd type="none" w="med" len="med"/>
+                    </a:lnB>
+                    <a:solidFill>
+                      <a:schemeClr val="bg1"/>
+                    </a:solidFill>
+                  </a:tcPr>
+                </a:tc>
+                <a:extLst>
+                  <a:ext uri="{0D108BD9-81ED-4DB2-BD59-A6C34878D82A}">
+                    <a16:rowId xmlns:a16="http://schemas.microsoft.com/office/drawing/2014/main" val="1401371461"/>
+                  </a:ext>
+                </a:extLst>
+              </a:tr>
+              <a:tr h="370840">
+                <a:tc>
+                  <a:txBody>
+                    <a:bodyPr/>
+                    <a:lstStyle/>
+                    <a:p>
+                      <a:r>
+                        <a:rPr lang="en-US" dirty="0">
+                          <a:solidFill>
+                            <a:sysClr val="windowText" lastClr="000000"/>
+                          </a:solidFill>
+                        </a:rPr>
+                        <a:t>rice</a:t>
+                      </a:r>
+                    </a:p>
+                  </a:txBody>
+                  <a:tcPr>
+                    <a:lnL w="12700" cap="flat" cmpd="sng" algn="ctr">
+                      <a:solidFill>
+                        <a:schemeClr val="tx1"/>
+                      </a:solidFill>
+                      <a:prstDash val="solid"/>
+                      <a:round/>
+                      <a:headEnd type="none" w="med" len="med"/>
+                      <a:tailEnd type="none" w="med" len="med"/>
+                    </a:lnL>
+                    <a:lnR w="12700" cap="flat" cmpd="sng" algn="ctr">
+                      <a:solidFill>
+                        <a:schemeClr val="tx1"/>
+                      </a:solidFill>
+                      <a:prstDash val="solid"/>
+                      <a:round/>
+                      <a:headEnd type="none" w="med" len="med"/>
+                      <a:tailEnd type="none" w="med" len="med"/>
+                    </a:lnR>
+                    <a:lnT w="12700" cap="flat" cmpd="sng" algn="ctr">
+                      <a:solidFill>
+                        <a:schemeClr val="tx1"/>
+                      </a:solidFill>
+                      <a:prstDash val="solid"/>
+                      <a:round/>
+                      <a:headEnd type="none" w="med" len="med"/>
+                      <a:tailEnd type="none" w="med" len="med"/>
+                    </a:lnT>
+                    <a:lnB w="12700" cap="flat" cmpd="sng" algn="ctr">
+                      <a:solidFill>
+                        <a:schemeClr val="tx1"/>
+                      </a:solidFill>
+                      <a:prstDash val="solid"/>
+                      <a:round/>
+                      <a:headEnd type="none" w="med" len="med"/>
+                      <a:tailEnd type="none" w="med" len="med"/>
+                    </a:lnB>
+                    <a:solidFill>
+                      <a:schemeClr val="bg1"/>
+                    </a:solidFill>
+                  </a:tcPr>
+                </a:tc>
+                <a:tc>
+                  <a:txBody>
+                    <a:bodyPr/>
+                    <a:lstStyle/>
+                    <a:p>
+                      <a:r>
+                        <a:rPr lang="en-US" dirty="0">
+                          <a:solidFill>
+                            <a:sysClr val="windowText" lastClr="000000"/>
+                          </a:solidFill>
+                        </a:rPr>
+                        <a:t>0.12</a:t>
+                      </a:r>
+                    </a:p>
+                  </a:txBody>
+                  <a:tcPr>
+                    <a:lnL w="12700" cap="flat" cmpd="sng" algn="ctr">
+                      <a:solidFill>
+                        <a:schemeClr val="tx1"/>
+                      </a:solidFill>
+                      <a:prstDash val="solid"/>
+                      <a:round/>
+                      <a:headEnd type="none" w="med" len="med"/>
+                      <a:tailEnd type="none" w="med" len="med"/>
+                    </a:lnL>
+                    <a:lnR w="12700" cap="flat" cmpd="sng" algn="ctr">
+                      <a:solidFill>
+                        <a:schemeClr val="tx1"/>
+                      </a:solidFill>
+                      <a:prstDash val="solid"/>
+                      <a:round/>
+                      <a:headEnd type="none" w="med" len="med"/>
+                      <a:tailEnd type="none" w="med" len="med"/>
+                    </a:lnR>
+                    <a:lnT w="12700" cap="flat" cmpd="sng" algn="ctr">
+                      <a:solidFill>
+                        <a:schemeClr val="tx1"/>
+                      </a:solidFill>
+                      <a:prstDash val="solid"/>
+                      <a:round/>
+                      <a:headEnd type="none" w="med" len="med"/>
+                      <a:tailEnd type="none" w="med" len="med"/>
+                    </a:lnT>
+                    <a:lnB w="12700" cap="flat" cmpd="sng" algn="ctr">
+                      <a:solidFill>
+                        <a:schemeClr val="tx1"/>
+                      </a:solidFill>
+                      <a:prstDash val="solid"/>
+                      <a:round/>
+                      <a:headEnd type="none" w="med" len="med"/>
+                      <a:tailEnd type="none" w="med" len="med"/>
+                    </a:lnB>
+                    <a:solidFill>
+                      <a:schemeClr val="bg1"/>
+                    </a:solidFill>
+                  </a:tcPr>
+                </a:tc>
+                <a:extLst>
+                  <a:ext uri="{0D108BD9-81ED-4DB2-BD59-A6C34878D82A}">
+                    <a16:rowId xmlns:a16="http://schemas.microsoft.com/office/drawing/2014/main" val="1581515868"/>
+                  </a:ext>
+                </a:extLst>
+              </a:tr>
+              <a:tr h="370840">
+                <a:tc>
+                  <a:txBody>
+                    <a:bodyPr/>
+                    <a:lstStyle/>
+                    <a:p>
+                      <a:r>
+                        <a:rPr lang="en-US" dirty="0">
+                          <a:solidFill>
+                            <a:sysClr val="windowText" lastClr="000000"/>
+                          </a:solidFill>
+                        </a:rPr>
+                        <a:t>wheat</a:t>
+                      </a:r>
+                    </a:p>
+                  </a:txBody>
+                  <a:tcPr>
+                    <a:lnL w="12700" cap="flat" cmpd="sng" algn="ctr">
+                      <a:solidFill>
+                        <a:schemeClr val="tx1"/>
+                      </a:solidFill>
+                      <a:prstDash val="solid"/>
+                      <a:round/>
+                      <a:headEnd type="none" w="med" len="med"/>
+                      <a:tailEnd type="none" w="med" len="med"/>
+                    </a:lnL>
+                    <a:lnR w="12700" cap="flat" cmpd="sng" algn="ctr">
+                      <a:solidFill>
+                        <a:schemeClr val="tx1"/>
+                      </a:solidFill>
+                      <a:prstDash val="solid"/>
+                      <a:round/>
+                      <a:headEnd type="none" w="med" len="med"/>
+                      <a:tailEnd type="none" w="med" len="med"/>
+                    </a:lnR>
+                    <a:lnT w="12700" cap="flat" cmpd="sng" algn="ctr">
+                      <a:solidFill>
+                        <a:schemeClr val="tx1"/>
+                      </a:solidFill>
+                      <a:prstDash val="solid"/>
+                      <a:round/>
+                      <a:headEnd type="none" w="med" len="med"/>
+                      <a:tailEnd type="none" w="med" len="med"/>
+                    </a:lnT>
+                    <a:lnB w="12700" cap="flat" cmpd="sng" algn="ctr">
+                      <a:solidFill>
+                        <a:schemeClr val="tx1"/>
+                      </a:solidFill>
+                      <a:prstDash val="solid"/>
+                      <a:round/>
+                      <a:headEnd type="none" w="med" len="med"/>
+                      <a:tailEnd type="none" w="med" len="med"/>
+                    </a:lnB>
+                    <a:solidFill>
+                      <a:schemeClr val="bg1"/>
+                    </a:solidFill>
+                  </a:tcPr>
+                </a:tc>
+                <a:tc>
+                  <a:txBody>
+                    <a:bodyPr/>
+                    <a:lstStyle/>
+                    <a:p>
+                      <a:r>
+                        <a:rPr lang="en-US" dirty="0">
+                          <a:solidFill>
+                            <a:sysClr val="windowText" lastClr="000000"/>
+                          </a:solidFill>
+                        </a:rPr>
+                        <a:t>0.33</a:t>
+                      </a:r>
+                    </a:p>
+                  </a:txBody>
+                  <a:tcPr>
+                    <a:lnL w="12700" cap="flat" cmpd="sng" algn="ctr">
+                      <a:solidFill>
+                        <a:schemeClr val="tx1"/>
+                      </a:solidFill>
+                      <a:prstDash val="solid"/>
+                      <a:round/>
+                      <a:headEnd type="none" w="med" len="med"/>
+                      <a:tailEnd type="none" w="med" len="med"/>
+                    </a:lnL>
+                    <a:lnR w="12700" cap="flat" cmpd="sng" algn="ctr">
+                      <a:solidFill>
+                        <a:schemeClr val="tx1"/>
+                      </a:solidFill>
+                      <a:prstDash val="solid"/>
+                      <a:round/>
+                      <a:headEnd type="none" w="med" len="med"/>
+                      <a:tailEnd type="none" w="med" len="med"/>
+                    </a:lnR>
+                    <a:lnT w="12700" cap="flat" cmpd="sng" algn="ctr">
+                      <a:solidFill>
+                        <a:schemeClr val="tx1"/>
+                      </a:solidFill>
+                      <a:prstDash val="solid"/>
+                      <a:round/>
+                      <a:headEnd type="none" w="med" len="med"/>
+                      <a:tailEnd type="none" w="med" len="med"/>
+                    </a:lnT>
+                    <a:lnB w="12700" cap="flat" cmpd="sng" algn="ctr">
+                      <a:solidFill>
+                        <a:schemeClr val="tx1"/>
+                      </a:solidFill>
+                      <a:prstDash val="solid"/>
+                      <a:round/>
+                      <a:headEnd type="none" w="med" len="med"/>
+                      <a:tailEnd type="none" w="med" len="med"/>
+                    </a:lnB>
+                    <a:solidFill>
+                      <a:schemeClr val="bg1"/>
+                    </a:solidFill>
+                  </a:tcPr>
+                </a:tc>
+                <a:extLst>
+                  <a:ext uri="{0D108BD9-81ED-4DB2-BD59-A6C34878D82A}">
+                    <a16:rowId xmlns:a16="http://schemas.microsoft.com/office/drawing/2014/main" val="3744004049"/>
+                  </a:ext>
+                </a:extLst>
+              </a:tr>
+              <a:tr h="370840">
+                <a:tc>
+                  <a:txBody>
+                    <a:bodyPr/>
+                    <a:lstStyle/>
+                    <a:p>
+                      <a:r>
+                        <a:rPr lang="en-US" dirty="0">
+                          <a:solidFill>
+                            <a:sysClr val="windowText" lastClr="000000"/>
+                          </a:solidFill>
+                        </a:rPr>
+                        <a:t>wheat</a:t>
+                      </a:r>
+                    </a:p>
+                  </a:txBody>
+                  <a:tcPr>
+                    <a:lnL w="12700" cap="flat" cmpd="sng" algn="ctr">
+                      <a:solidFill>
+                        <a:schemeClr val="tx1"/>
+                      </a:solidFill>
+                      <a:prstDash val="solid"/>
+                      <a:round/>
+                      <a:headEnd type="none" w="med" len="med"/>
+                      <a:tailEnd type="none" w="med" len="med"/>
+                    </a:lnL>
+                    <a:lnR w="12700" cap="flat" cmpd="sng" algn="ctr">
+                      <a:solidFill>
+                        <a:schemeClr val="tx1"/>
+                      </a:solidFill>
+                      <a:prstDash val="solid"/>
+                      <a:round/>
+                      <a:headEnd type="none" w="med" len="med"/>
+                      <a:tailEnd type="none" w="med" len="med"/>
+                    </a:lnR>
+                    <a:lnT w="12700" cap="flat" cmpd="sng" algn="ctr">
+                      <a:solidFill>
+                        <a:schemeClr val="tx1"/>
+                      </a:solidFill>
+                      <a:prstDash val="solid"/>
+                      <a:round/>
+                      <a:headEnd type="none" w="med" len="med"/>
+                      <a:tailEnd type="none" w="med" len="med"/>
+                    </a:lnT>
+                    <a:lnB w="12700" cap="flat" cmpd="sng" algn="ctr">
+                      <a:solidFill>
+                        <a:schemeClr val="tx1"/>
+                      </a:solidFill>
+                      <a:prstDash val="solid"/>
+                      <a:round/>
+                      <a:headEnd type="none" w="med" len="med"/>
+                      <a:tailEnd type="none" w="med" len="med"/>
+                    </a:lnB>
+                    <a:solidFill>
+                      <a:schemeClr val="bg1"/>
+                    </a:solidFill>
+                  </a:tcPr>
+                </a:tc>
+                <a:tc>
+                  <a:txBody>
+                    <a:bodyPr/>
+                    <a:lstStyle/>
+                    <a:p>
+                      <a:r>
+                        <a:rPr lang="en-US" dirty="0">
+                          <a:solidFill>
+                            <a:sysClr val="windowText" lastClr="000000"/>
+                          </a:solidFill>
+                        </a:rPr>
+                        <a:t>0.48</a:t>
+                      </a:r>
+                    </a:p>
+                  </a:txBody>
+                  <a:tcPr>
+                    <a:lnL w="12700" cap="flat" cmpd="sng" algn="ctr">
+                      <a:solidFill>
+                        <a:schemeClr val="tx1"/>
+                      </a:solidFill>
+                      <a:prstDash val="solid"/>
+                      <a:round/>
+                      <a:headEnd type="none" w="med" len="med"/>
+                      <a:tailEnd type="none" w="med" len="med"/>
+                    </a:lnL>
+                    <a:lnR w="12700" cap="flat" cmpd="sng" algn="ctr">
+                      <a:solidFill>
+                        <a:schemeClr val="tx1"/>
+                      </a:solidFill>
+                      <a:prstDash val="solid"/>
+                      <a:round/>
+                      <a:headEnd type="none" w="med" len="med"/>
+                      <a:tailEnd type="none" w="med" len="med"/>
+                    </a:lnR>
+                    <a:lnT w="12700" cap="flat" cmpd="sng" algn="ctr">
+                      <a:solidFill>
+                        <a:schemeClr val="tx1"/>
+                      </a:solidFill>
+                      <a:prstDash val="solid"/>
+                      <a:round/>
+                      <a:headEnd type="none" w="med" len="med"/>
+                      <a:tailEnd type="none" w="med" len="med"/>
+                    </a:lnT>
+                    <a:lnB w="12700" cap="flat" cmpd="sng" algn="ctr">
+                      <a:solidFill>
+                        <a:schemeClr val="tx1"/>
+                      </a:solidFill>
+                      <a:prstDash val="solid"/>
+                      <a:round/>
+                      <a:headEnd type="none" w="med" len="med"/>
+                      <a:tailEnd type="none" w="med" len="med"/>
+                    </a:lnB>
+                    <a:solidFill>
+                      <a:schemeClr val="bg1"/>
+                    </a:solidFill>
+                  </a:tcPr>
+                </a:tc>
+                <a:extLst>
+                  <a:ext uri="{0D108BD9-81ED-4DB2-BD59-A6C34878D82A}">
+                    <a16:rowId xmlns:a16="http://schemas.microsoft.com/office/drawing/2014/main" val="747117230"/>
+                  </a:ext>
+                </a:extLst>
+              </a:tr>
+              <a:tr h="370840">
+                <a:tc>
+                  <a:txBody>
+                    <a:bodyPr/>
+                    <a:lstStyle/>
+                    <a:p>
+                      <a:r>
+                        <a:rPr lang="en-US" dirty="0">
+                          <a:solidFill>
+                            <a:sysClr val="windowText" lastClr="000000"/>
+                          </a:solidFill>
+                        </a:rPr>
+                        <a:t>rice</a:t>
+                      </a:r>
+                    </a:p>
+                  </a:txBody>
+                  <a:tcPr>
+                    <a:lnL w="12700" cap="flat" cmpd="sng" algn="ctr">
+                      <a:solidFill>
+                        <a:schemeClr val="tx1"/>
+                      </a:solidFill>
+                      <a:prstDash val="solid"/>
+                      <a:round/>
+                      <a:headEnd type="none" w="med" len="med"/>
+                      <a:tailEnd type="none" w="med" len="med"/>
+                    </a:lnL>
+                    <a:lnR w="12700" cap="flat" cmpd="sng" algn="ctr">
+                      <a:solidFill>
+                        <a:schemeClr val="tx1"/>
+                      </a:solidFill>
+                      <a:prstDash val="solid"/>
+                      <a:round/>
+                      <a:headEnd type="none" w="med" len="med"/>
+                      <a:tailEnd type="none" w="med" len="med"/>
+                    </a:lnR>
+                    <a:lnT w="12700" cap="flat" cmpd="sng" algn="ctr">
+                      <a:solidFill>
+                        <a:schemeClr val="tx1"/>
+                      </a:solidFill>
+                      <a:prstDash val="solid"/>
+                      <a:round/>
+                      <a:headEnd type="none" w="med" len="med"/>
+                      <a:tailEnd type="none" w="med" len="med"/>
+                    </a:lnT>
+                    <a:lnB w="12700" cap="flat" cmpd="sng" algn="ctr">
+                      <a:solidFill>
+                        <a:schemeClr val="tx1"/>
+                      </a:solidFill>
+                      <a:prstDash val="solid"/>
+                      <a:round/>
+                      <a:headEnd type="none" w="med" len="med"/>
+                      <a:tailEnd type="none" w="med" len="med"/>
+                    </a:lnB>
+                    <a:solidFill>
+                      <a:schemeClr val="bg1"/>
+                    </a:solidFill>
+                  </a:tcPr>
+                </a:tc>
+                <a:tc>
+                  <a:txBody>
+                    <a:bodyPr/>
+                    <a:lstStyle/>
+                    <a:p>
+                      <a:r>
+                        <a:rPr lang="en-US" dirty="0">
+                          <a:solidFill>
+                            <a:sysClr val="windowText" lastClr="000000"/>
+                          </a:solidFill>
+                        </a:rPr>
+                        <a:t>0.20</a:t>
+                      </a:r>
+                    </a:p>
+                  </a:txBody>
+                  <a:tcPr>
+                    <a:lnL w="12700" cap="flat" cmpd="sng" algn="ctr">
+                      <a:solidFill>
+                        <a:schemeClr val="tx1"/>
+                      </a:solidFill>
+                      <a:prstDash val="solid"/>
+                      <a:round/>
+                      <a:headEnd type="none" w="med" len="med"/>
+                      <a:tailEnd type="none" w="med" len="med"/>
+                    </a:lnL>
+                    <a:lnR w="12700" cap="flat" cmpd="sng" algn="ctr">
+                      <a:solidFill>
+                        <a:schemeClr val="tx1"/>
+                      </a:solidFill>
+                      <a:prstDash val="solid"/>
+                      <a:round/>
+                      <a:headEnd type="none" w="med" len="med"/>
+                      <a:tailEnd type="none" w="med" len="med"/>
+                    </a:lnR>
+                    <a:lnT w="12700" cap="flat" cmpd="sng" algn="ctr">
+                      <a:solidFill>
+                        <a:schemeClr val="tx1"/>
+                      </a:solidFill>
+                      <a:prstDash val="solid"/>
+                      <a:round/>
+                      <a:headEnd type="none" w="med" len="med"/>
+                      <a:tailEnd type="none" w="med" len="med"/>
+                    </a:lnT>
+                    <a:lnB w="12700" cap="flat" cmpd="sng" algn="ctr">
+                      <a:solidFill>
+                        <a:schemeClr val="tx1"/>
+                      </a:solidFill>
+                      <a:prstDash val="solid"/>
+                      <a:round/>
+                      <a:headEnd type="none" w="med" len="med"/>
+                      <a:tailEnd type="none" w="med" len="med"/>
+                    </a:lnB>
+                    <a:solidFill>
+                      <a:schemeClr val="bg1"/>
+                    </a:solidFill>
+                  </a:tcPr>
+                </a:tc>
+                <a:extLst>
+                  <a:ext uri="{0D108BD9-81ED-4DB2-BD59-A6C34878D82A}">
+                    <a16:rowId xmlns:a16="http://schemas.microsoft.com/office/drawing/2014/main" val="1031901724"/>
+                  </a:ext>
+                </a:extLst>
+              </a:tr>
+              <a:tr h="370840">
+                <a:tc>
+                  <a:txBody>
+                    <a:bodyPr/>
+                    <a:lstStyle/>
+                    <a:p>
+                      <a:r>
+                        <a:rPr lang="en-US" dirty="0">
+                          <a:solidFill>
+                            <a:sysClr val="windowText" lastClr="000000"/>
+                          </a:solidFill>
+                        </a:rPr>
+                        <a:t>corn</a:t>
+                      </a:r>
+                    </a:p>
+                  </a:txBody>
+                  <a:tcPr>
+                    <a:lnL w="12700" cap="flat" cmpd="sng" algn="ctr">
+                      <a:solidFill>
+                        <a:schemeClr val="tx1"/>
+                      </a:solidFill>
+                      <a:prstDash val="solid"/>
+                      <a:round/>
+                      <a:headEnd type="none" w="med" len="med"/>
+                      <a:tailEnd type="none" w="med" len="med"/>
+                    </a:lnL>
+                    <a:lnR w="12700" cap="flat" cmpd="sng" algn="ctr">
+                      <a:solidFill>
+                        <a:schemeClr val="tx1"/>
+                      </a:solidFill>
+                      <a:prstDash val="solid"/>
+                      <a:round/>
+                      <a:headEnd type="none" w="med" len="med"/>
+                      <a:tailEnd type="none" w="med" len="med"/>
+                    </a:lnR>
+                    <a:lnT w="12700" cap="flat" cmpd="sng" algn="ctr">
+                      <a:solidFill>
+                        <a:schemeClr val="tx1"/>
+                      </a:solidFill>
+                      <a:prstDash val="solid"/>
+                      <a:round/>
+                      <a:headEnd type="none" w="med" len="med"/>
+                      <a:tailEnd type="none" w="med" len="med"/>
+                    </a:lnT>
+                    <a:lnB w="12700" cap="flat" cmpd="sng" algn="ctr">
+                      <a:solidFill>
+                        <a:schemeClr val="tx1"/>
+                      </a:solidFill>
+                      <a:prstDash val="solid"/>
+                      <a:round/>
+                      <a:headEnd type="none" w="med" len="med"/>
+                      <a:tailEnd type="none" w="med" len="med"/>
+                    </a:lnB>
+                    <a:solidFill>
+                      <a:schemeClr val="bg1"/>
+                    </a:solidFill>
+                  </a:tcPr>
+                </a:tc>
+                <a:tc>
+                  <a:txBody>
+                    <a:bodyPr/>
+                    <a:lstStyle/>
+                    <a:p>
+                      <a:r>
+                        <a:rPr lang="en-US" dirty="0">
+                          <a:solidFill>
+                            <a:sysClr val="windowText" lastClr="000000"/>
+                          </a:solidFill>
+                        </a:rPr>
+                        <a:t>0.78</a:t>
+                      </a:r>
+                    </a:p>
+                  </a:txBody>
+                  <a:tcPr>
+                    <a:lnL w="12700" cap="flat" cmpd="sng" algn="ctr">
+                      <a:solidFill>
+                        <a:schemeClr val="tx1"/>
+                      </a:solidFill>
+                      <a:prstDash val="solid"/>
+                      <a:round/>
+                      <a:headEnd type="none" w="med" len="med"/>
+                      <a:tailEnd type="none" w="med" len="med"/>
+                    </a:lnL>
+                    <a:lnR w="12700" cap="flat" cmpd="sng" algn="ctr">
+                      <a:solidFill>
+                        <a:schemeClr val="tx1"/>
+                      </a:solidFill>
+                      <a:prstDash val="solid"/>
+                      <a:round/>
+                      <a:headEnd type="none" w="med" len="med"/>
+                      <a:tailEnd type="none" w="med" len="med"/>
+                    </a:lnR>
+                    <a:lnT w="12700" cap="flat" cmpd="sng" algn="ctr">
+                      <a:solidFill>
+                        <a:schemeClr val="tx1"/>
+                      </a:solidFill>
+                      <a:prstDash val="solid"/>
+                      <a:round/>
+                      <a:headEnd type="none" w="med" len="med"/>
+                      <a:tailEnd type="none" w="med" len="med"/>
+                    </a:lnT>
+                    <a:lnB w="12700" cap="flat" cmpd="sng" algn="ctr">
+                      <a:solidFill>
+                        <a:schemeClr val="tx1"/>
+                      </a:solidFill>
+                      <a:prstDash val="solid"/>
+                      <a:round/>
+                      <a:headEnd type="none" w="med" len="med"/>
+                      <a:tailEnd type="none" w="med" len="med"/>
+                    </a:lnB>
+                    <a:solidFill>
+                      <a:schemeClr val="bg1"/>
+                    </a:solidFill>
+                  </a:tcPr>
+                </a:tc>
+                <a:extLst>
+                  <a:ext uri="{0D108BD9-81ED-4DB2-BD59-A6C34878D82A}">
+                    <a16:rowId xmlns:a16="http://schemas.microsoft.com/office/drawing/2014/main" val="3282999668"/>
+                  </a:ext>
+                </a:extLst>
+              </a:tr>
+            </a:tbl>
+          </a:graphicData>
+        </a:graphic>
+      </p:graphicFrame>
+      <p:graphicFrame>
+        <p:nvGraphicFramePr>
+          <p:cNvPr id="5" name="Table 4">
+            <a:extLst>
+              <a:ext uri="{FF2B5EF4-FFF2-40B4-BE49-F238E27FC236}">
+                <a16:creationId xmlns:a16="http://schemas.microsoft.com/office/drawing/2014/main" id="{D41F3974-0D07-CC46-9C42-C50D1561FC16}"/>
+              </a:ext>
+            </a:extLst>
+          </p:cNvPr>
+          <p:cNvGraphicFramePr>
+            <a:graphicFrameLocks noGrp="1"/>
+          </p:cNvGraphicFramePr>
+          <p:nvPr>
+            <p:extLst>
+              <p:ext uri="{D42A27DB-BD31-4B8C-83A1-F6EECF244321}">
+                <p14:modId xmlns:p14="http://schemas.microsoft.com/office/powerpoint/2010/main" val="3432886402"/>
+              </p:ext>
+            </p:extLst>
+          </p:nvPr>
+        </p:nvGraphicFramePr>
+        <p:xfrm>
+          <a:off x="5561914" y="1439332"/>
+          <a:ext cx="4173840" cy="2595880"/>
+        </p:xfrm>
+        <a:graphic>
+          <a:graphicData uri="http://schemas.openxmlformats.org/drawingml/2006/table">
+            <a:tbl>
+              <a:tblPr firstRow="1" bandRow="1">
+                <a:tableStyleId>{5C22544A-7EE6-4342-B048-85BDC9FD1C3A}</a:tableStyleId>
+              </a:tblPr>
+              <a:tblGrid>
+                <a:gridCol w="1043460">
+                  <a:extLst>
+                    <a:ext uri="{9D8B030D-6E8A-4147-A177-3AD203B41FA5}">
+                      <a16:colId xmlns:a16="http://schemas.microsoft.com/office/drawing/2014/main" val="4157979678"/>
+                    </a:ext>
+                  </a:extLst>
+                </a:gridCol>
+                <a:gridCol w="1043460">
+                  <a:extLst>
+                    <a:ext uri="{9D8B030D-6E8A-4147-A177-3AD203B41FA5}">
+                      <a16:colId xmlns:a16="http://schemas.microsoft.com/office/drawing/2014/main" val="1262757143"/>
+                    </a:ext>
+                  </a:extLst>
+                </a:gridCol>
+                <a:gridCol w="1043460">
+                  <a:extLst>
+                    <a:ext uri="{9D8B030D-6E8A-4147-A177-3AD203B41FA5}">
+                      <a16:colId xmlns:a16="http://schemas.microsoft.com/office/drawing/2014/main" val="4000952127"/>
+                    </a:ext>
+                  </a:extLst>
+                </a:gridCol>
+                <a:gridCol w="1043460">
+                  <a:extLst>
+                    <a:ext uri="{9D8B030D-6E8A-4147-A177-3AD203B41FA5}">
+                      <a16:colId xmlns:a16="http://schemas.microsoft.com/office/drawing/2014/main" val="1058374735"/>
+                    </a:ext>
+                  </a:extLst>
+                </a:gridCol>
+              </a:tblGrid>
+              <a:tr h="370840">
+                <a:tc>
+                  <a:txBody>
+                    <a:bodyPr/>
+                    <a:lstStyle/>
+                    <a:p>
+                      <a:pPr algn="ctr"/>
+                      <a:r>
+                        <a:rPr lang="en-US" dirty="0">
+                          <a:solidFill>
+                            <a:sysClr val="windowText" lastClr="000000"/>
+                          </a:solidFill>
+                        </a:rPr>
+                        <a:t>corn</a:t>
+                      </a:r>
+                    </a:p>
+                  </a:txBody>
+                  <a:tcPr>
+                    <a:lnL w="12700" cap="flat" cmpd="sng" algn="ctr">
+                      <a:solidFill>
+                        <a:schemeClr val="tx1"/>
+                      </a:solidFill>
+                      <a:prstDash val="solid"/>
+                      <a:round/>
+                      <a:headEnd type="none" w="med" len="med"/>
+                      <a:tailEnd type="none" w="med" len="med"/>
+                    </a:lnL>
+                    <a:lnR w="12700" cap="flat" cmpd="sng" algn="ctr">
+                      <a:solidFill>
+                        <a:schemeClr val="tx1"/>
+                      </a:solidFill>
+                      <a:prstDash val="solid"/>
+                      <a:round/>
+                      <a:headEnd type="none" w="med" len="med"/>
+                      <a:tailEnd type="none" w="med" len="med"/>
+                    </a:lnR>
+                    <a:lnT w="12700" cap="flat" cmpd="sng" algn="ctr">
+                      <a:solidFill>
+                        <a:schemeClr val="tx1"/>
+                      </a:solidFill>
+                      <a:prstDash val="solid"/>
+                      <a:round/>
+                      <a:headEnd type="none" w="med" len="med"/>
+                      <a:tailEnd type="none" w="med" len="med"/>
+                    </a:lnT>
+                    <a:lnB w="12700" cap="flat" cmpd="sng" algn="ctr">
+                      <a:solidFill>
+                        <a:schemeClr val="tx1"/>
+                      </a:solidFill>
+                      <a:prstDash val="solid"/>
+                      <a:round/>
+                      <a:headEnd type="none" w="med" len="med"/>
+                      <a:tailEnd type="none" w="med" len="med"/>
+                    </a:lnB>
+                    <a:solidFill>
+                      <a:schemeClr val="bg1"/>
+                    </a:solidFill>
+                  </a:tcPr>
+                </a:tc>
+                <a:tc>
+                  <a:txBody>
+                    <a:bodyPr/>
+                    <a:lstStyle/>
+                    <a:p>
+                      <a:pPr algn="ctr"/>
+                      <a:r>
+                        <a:rPr lang="en-US" dirty="0">
+                          <a:solidFill>
+                            <a:sysClr val="windowText" lastClr="000000"/>
+                          </a:solidFill>
+                        </a:rPr>
+                        <a:t>rice</a:t>
+                      </a:r>
+                    </a:p>
+                  </a:txBody>
+                  <a:tcPr>
+                    <a:lnL w="12700" cap="flat" cmpd="sng" algn="ctr">
+                      <a:solidFill>
+                        <a:schemeClr val="tx1"/>
+                      </a:solidFill>
+                      <a:prstDash val="solid"/>
+                      <a:round/>
+                      <a:headEnd type="none" w="med" len="med"/>
+                      <a:tailEnd type="none" w="med" len="med"/>
+                    </a:lnL>
+                    <a:lnR w="12700" cap="flat" cmpd="sng" algn="ctr">
+                      <a:solidFill>
+                        <a:schemeClr val="tx1"/>
+                      </a:solidFill>
+                      <a:prstDash val="solid"/>
+                      <a:round/>
+                      <a:headEnd type="none" w="med" len="med"/>
+                      <a:tailEnd type="none" w="med" len="med"/>
+                    </a:lnR>
+                    <a:lnT w="12700" cap="flat" cmpd="sng" algn="ctr">
+                      <a:solidFill>
+                        <a:schemeClr val="tx1"/>
+                      </a:solidFill>
+                      <a:prstDash val="solid"/>
+                      <a:round/>
+                      <a:headEnd type="none" w="med" len="med"/>
+                      <a:tailEnd type="none" w="med" len="med"/>
+                    </a:lnT>
+                    <a:lnB w="12700" cap="flat" cmpd="sng" algn="ctr">
+                      <a:solidFill>
+                        <a:schemeClr val="tx1"/>
+                      </a:solidFill>
+                      <a:prstDash val="solid"/>
+                      <a:round/>
+                      <a:headEnd type="none" w="med" len="med"/>
+                      <a:tailEnd type="none" w="med" len="med"/>
+                    </a:lnB>
+                    <a:solidFill>
+                      <a:schemeClr val="bg1"/>
+                    </a:solidFill>
+                  </a:tcPr>
+                </a:tc>
+                <a:tc>
+                  <a:txBody>
+                    <a:bodyPr/>
+                    <a:lstStyle/>
+                    <a:p>
+                      <a:pPr algn="ctr"/>
+                      <a:r>
+                        <a:rPr lang="en-US" dirty="0">
+                          <a:solidFill>
+                            <a:sysClr val="windowText" lastClr="000000"/>
+                          </a:solidFill>
+                        </a:rPr>
+                        <a:t>wheat</a:t>
+                      </a:r>
+                    </a:p>
+                  </a:txBody>
+                  <a:tcPr>
+                    <a:lnL w="12700" cap="flat" cmpd="sng" algn="ctr">
+                      <a:solidFill>
+                        <a:schemeClr val="tx1"/>
+                      </a:solidFill>
+                      <a:prstDash val="solid"/>
+                      <a:round/>
+                      <a:headEnd type="none" w="med" len="med"/>
+                      <a:tailEnd type="none" w="med" len="med"/>
+                    </a:lnL>
+                    <a:lnR w="12700" cap="flat" cmpd="sng" algn="ctr">
+                      <a:solidFill>
+                        <a:schemeClr val="tx1"/>
+                      </a:solidFill>
+                      <a:prstDash val="solid"/>
+                      <a:round/>
+                      <a:headEnd type="none" w="med" len="med"/>
+                      <a:tailEnd type="none" w="med" len="med"/>
+                    </a:lnR>
+                    <a:lnT w="12700" cap="flat" cmpd="sng" algn="ctr">
+                      <a:solidFill>
+                        <a:schemeClr val="tx1"/>
+                      </a:solidFill>
+                      <a:prstDash val="solid"/>
+                      <a:round/>
+                      <a:headEnd type="none" w="med" len="med"/>
+                      <a:tailEnd type="none" w="med" len="med"/>
+                    </a:lnT>
+                    <a:lnB w="12700" cap="flat" cmpd="sng" algn="ctr">
+                      <a:solidFill>
+                        <a:schemeClr val="tx1"/>
+                      </a:solidFill>
+                      <a:prstDash val="solid"/>
+                      <a:round/>
+                      <a:headEnd type="none" w="med" len="med"/>
+                      <a:tailEnd type="none" w="med" len="med"/>
+                    </a:lnB>
+                    <a:solidFill>
+                      <a:schemeClr val="bg1"/>
+                    </a:solidFill>
+                  </a:tcPr>
+                </a:tc>
+                <a:tc>
+                  <a:txBody>
+                    <a:bodyPr/>
+                    <a:lstStyle/>
+                    <a:p>
+                      <a:r>
+                        <a:rPr lang="en-US" dirty="0" err="1">
+                          <a:solidFill>
+                            <a:sysClr val="windowText" lastClr="000000"/>
+                          </a:solidFill>
+                        </a:rPr>
+                        <a:t>perc_N</a:t>
+                      </a:r>
+                      <a:endParaRPr lang="en-US" dirty="0">
+                        <a:solidFill>
+                          <a:sysClr val="windowText" lastClr="000000"/>
+                        </a:solidFill>
+                      </a:endParaRPr>
+                    </a:p>
+                  </a:txBody>
+                  <a:tcPr>
+                    <a:lnL w="12700" cap="flat" cmpd="sng" algn="ctr">
+                      <a:solidFill>
+                        <a:schemeClr val="tx1"/>
+                      </a:solidFill>
+                      <a:prstDash val="solid"/>
+                      <a:round/>
+                      <a:headEnd type="none" w="med" len="med"/>
+                      <a:tailEnd type="none" w="med" len="med"/>
+                    </a:lnL>
+                    <a:lnR w="12700" cap="flat" cmpd="sng" algn="ctr">
+                      <a:solidFill>
+                        <a:schemeClr val="tx1"/>
+                      </a:solidFill>
+                      <a:prstDash val="solid"/>
+                      <a:round/>
+                      <a:headEnd type="none" w="med" len="med"/>
+                      <a:tailEnd type="none" w="med" len="med"/>
+                    </a:lnR>
+                    <a:lnT w="12700" cap="flat" cmpd="sng" algn="ctr">
+                      <a:solidFill>
+                        <a:schemeClr val="tx1"/>
+                      </a:solidFill>
+                      <a:prstDash val="solid"/>
+                      <a:round/>
+                      <a:headEnd type="none" w="med" len="med"/>
+                      <a:tailEnd type="none" w="med" len="med"/>
+                    </a:lnT>
+                    <a:lnB w="12700" cap="flat" cmpd="sng" algn="ctr">
+                      <a:solidFill>
+                        <a:schemeClr val="tx1"/>
+                      </a:solidFill>
+                      <a:prstDash val="solid"/>
+                      <a:round/>
+                      <a:headEnd type="none" w="med" len="med"/>
+                      <a:tailEnd type="none" w="med" len="med"/>
+                    </a:lnB>
+                    <a:solidFill>
+                      <a:schemeClr val="bg1"/>
+                    </a:solidFill>
+                  </a:tcPr>
+                </a:tc>
+                <a:extLst>
+                  <a:ext uri="{0D108BD9-81ED-4DB2-BD59-A6C34878D82A}">
+                    <a16:rowId xmlns:a16="http://schemas.microsoft.com/office/drawing/2014/main" val="2982465084"/>
+                  </a:ext>
+                </a:extLst>
+              </a:tr>
+              <a:tr h="370840">
+                <a:tc>
+                  <a:txBody>
+                    <a:bodyPr/>
+                    <a:lstStyle/>
+                    <a:p>
+                      <a:pPr algn="ctr"/>
+                      <a:r>
+                        <a:rPr lang="en-US" dirty="0">
+                          <a:solidFill>
+                            <a:sysClr val="windowText" lastClr="000000"/>
+                          </a:solidFill>
+                        </a:rPr>
+                        <a:t>1</a:t>
+                      </a:r>
+                    </a:p>
+                  </a:txBody>
+                  <a:tcPr>
+                    <a:lnL w="12700" cap="flat" cmpd="sng" algn="ctr">
+                      <a:solidFill>
+                        <a:schemeClr val="tx1"/>
+                      </a:solidFill>
+                      <a:prstDash val="solid"/>
+                      <a:round/>
+                      <a:headEnd type="none" w="med" len="med"/>
+                      <a:tailEnd type="none" w="med" len="med"/>
+                    </a:lnL>
+                    <a:lnR w="12700" cap="flat" cmpd="sng" algn="ctr">
+                      <a:solidFill>
+                        <a:schemeClr val="tx1"/>
+                      </a:solidFill>
+                      <a:prstDash val="solid"/>
+                      <a:round/>
+                      <a:headEnd type="none" w="med" len="med"/>
+                      <a:tailEnd type="none" w="med" len="med"/>
+                    </a:lnR>
+                    <a:lnT w="12700" cap="flat" cmpd="sng" algn="ctr">
+                      <a:solidFill>
+                        <a:schemeClr val="tx1"/>
+                      </a:solidFill>
+                      <a:prstDash val="solid"/>
+                      <a:round/>
+                      <a:headEnd type="none" w="med" len="med"/>
+                      <a:tailEnd type="none" w="med" len="med"/>
+                    </a:lnT>
+                    <a:lnB w="12700" cap="flat" cmpd="sng" algn="ctr">
+                      <a:solidFill>
+                        <a:schemeClr val="tx1"/>
+                      </a:solidFill>
+                      <a:prstDash val="solid"/>
+                      <a:round/>
+                      <a:headEnd type="none" w="med" len="med"/>
+                      <a:tailEnd type="none" w="med" len="med"/>
+                    </a:lnB>
+                    <a:solidFill>
+                      <a:schemeClr val="bg1"/>
+                    </a:solidFill>
+                  </a:tcPr>
+                </a:tc>
+                <a:tc>
+                  <a:txBody>
+                    <a:bodyPr/>
+                    <a:lstStyle/>
+                    <a:p>
+                      <a:pPr algn="ctr"/>
+                      <a:r>
+                        <a:rPr lang="en-US" dirty="0">
+                          <a:solidFill>
+                            <a:sysClr val="windowText" lastClr="000000"/>
+                          </a:solidFill>
+                        </a:rPr>
+                        <a:t>0</a:t>
+                      </a:r>
+                    </a:p>
+                  </a:txBody>
+                  <a:tcPr>
+                    <a:lnL w="12700" cap="flat" cmpd="sng" algn="ctr">
+                      <a:solidFill>
+                        <a:schemeClr val="tx1"/>
+                      </a:solidFill>
+                      <a:prstDash val="solid"/>
+                      <a:round/>
+                      <a:headEnd type="none" w="med" len="med"/>
+                      <a:tailEnd type="none" w="med" len="med"/>
+                    </a:lnL>
+                    <a:lnR w="12700" cap="flat" cmpd="sng" algn="ctr">
+                      <a:solidFill>
+                        <a:schemeClr val="tx1"/>
+                      </a:solidFill>
+                      <a:prstDash val="solid"/>
+                      <a:round/>
+                      <a:headEnd type="none" w="med" len="med"/>
+                      <a:tailEnd type="none" w="med" len="med"/>
+                    </a:lnR>
+                    <a:lnT w="12700" cap="flat" cmpd="sng" algn="ctr">
+                      <a:solidFill>
+                        <a:schemeClr val="tx1"/>
+                      </a:solidFill>
+                      <a:prstDash val="solid"/>
+                      <a:round/>
+                      <a:headEnd type="none" w="med" len="med"/>
+                      <a:tailEnd type="none" w="med" len="med"/>
+                    </a:lnT>
+                    <a:lnB w="12700" cap="flat" cmpd="sng" algn="ctr">
+                      <a:solidFill>
+                        <a:schemeClr val="tx1"/>
+                      </a:solidFill>
+                      <a:prstDash val="solid"/>
+                      <a:round/>
+                      <a:headEnd type="none" w="med" len="med"/>
+                      <a:tailEnd type="none" w="med" len="med"/>
+                    </a:lnB>
+                    <a:solidFill>
+                      <a:schemeClr val="bg1"/>
+                    </a:solidFill>
+                  </a:tcPr>
+                </a:tc>
+                <a:tc>
+                  <a:txBody>
+                    <a:bodyPr/>
+                    <a:lstStyle/>
+                    <a:p>
+                      <a:pPr algn="ctr"/>
+                      <a:r>
+                        <a:rPr lang="en-US" dirty="0">
+                          <a:solidFill>
+                            <a:sysClr val="windowText" lastClr="000000"/>
+                          </a:solidFill>
+                        </a:rPr>
+                        <a:t>0</a:t>
+                      </a:r>
+                    </a:p>
+                  </a:txBody>
+                  <a:tcPr>
+                    <a:lnL w="12700" cap="flat" cmpd="sng" algn="ctr">
+                      <a:solidFill>
+                        <a:schemeClr val="tx1"/>
+                      </a:solidFill>
+                      <a:prstDash val="solid"/>
+                      <a:round/>
+                      <a:headEnd type="none" w="med" len="med"/>
+                      <a:tailEnd type="none" w="med" len="med"/>
+                    </a:lnL>
+                    <a:lnR w="12700" cap="flat" cmpd="sng" algn="ctr">
+                      <a:solidFill>
+                        <a:schemeClr val="tx1"/>
+                      </a:solidFill>
+                      <a:prstDash val="solid"/>
+                      <a:round/>
+                      <a:headEnd type="none" w="med" len="med"/>
+                      <a:tailEnd type="none" w="med" len="med"/>
+                    </a:lnR>
+                    <a:lnT w="12700" cap="flat" cmpd="sng" algn="ctr">
+                      <a:solidFill>
+                        <a:schemeClr val="tx1"/>
+                      </a:solidFill>
+                      <a:prstDash val="solid"/>
+                      <a:round/>
+                      <a:headEnd type="none" w="med" len="med"/>
+                      <a:tailEnd type="none" w="med" len="med"/>
+                    </a:lnT>
+                    <a:lnB w="12700" cap="flat" cmpd="sng" algn="ctr">
+                      <a:solidFill>
+                        <a:schemeClr val="tx1"/>
+                      </a:solidFill>
+                      <a:prstDash val="solid"/>
+                      <a:round/>
+                      <a:headEnd type="none" w="med" len="med"/>
+                      <a:tailEnd type="none" w="med" len="med"/>
+                    </a:lnB>
+                    <a:solidFill>
+                      <a:schemeClr val="bg1"/>
+                    </a:solidFill>
+                  </a:tcPr>
+                </a:tc>
+                <a:tc>
+                  <a:txBody>
+                    <a:bodyPr/>
+                    <a:lstStyle/>
+                    <a:p>
+                      <a:r>
+                        <a:rPr lang="en-US" dirty="0">
+                          <a:solidFill>
+                            <a:sysClr val="windowText" lastClr="000000"/>
+                          </a:solidFill>
+                        </a:rPr>
+                        <a:t>0.67</a:t>
+                      </a:r>
+                    </a:p>
+                  </a:txBody>
+                  <a:tcPr>
+                    <a:lnL w="12700" cap="flat" cmpd="sng" algn="ctr">
+                      <a:solidFill>
+                        <a:schemeClr val="tx1"/>
+                      </a:solidFill>
+                      <a:prstDash val="solid"/>
+                      <a:round/>
+                      <a:headEnd type="none" w="med" len="med"/>
+                      <a:tailEnd type="none" w="med" len="med"/>
+                    </a:lnL>
+                    <a:lnR w="12700" cap="flat" cmpd="sng" algn="ctr">
+                      <a:solidFill>
+                        <a:schemeClr val="tx1"/>
+                      </a:solidFill>
+                      <a:prstDash val="solid"/>
+                      <a:round/>
+                      <a:headEnd type="none" w="med" len="med"/>
+                      <a:tailEnd type="none" w="med" len="med"/>
+                    </a:lnR>
+                    <a:lnT w="12700" cap="flat" cmpd="sng" algn="ctr">
+                      <a:solidFill>
+                        <a:schemeClr val="tx1"/>
+                      </a:solidFill>
+                      <a:prstDash val="solid"/>
+                      <a:round/>
+                      <a:headEnd type="none" w="med" len="med"/>
+                      <a:tailEnd type="none" w="med" len="med"/>
+                    </a:lnT>
+                    <a:lnB w="12700" cap="flat" cmpd="sng" algn="ctr">
+                      <a:solidFill>
+                        <a:schemeClr val="tx1"/>
+                      </a:solidFill>
+                      <a:prstDash val="solid"/>
+                      <a:round/>
+                      <a:headEnd type="none" w="med" len="med"/>
+                      <a:tailEnd type="none" w="med" len="med"/>
+                    </a:lnB>
+                    <a:solidFill>
+                      <a:schemeClr val="bg1"/>
+                    </a:solidFill>
+                  </a:tcPr>
+                </a:tc>
+                <a:extLst>
+                  <a:ext uri="{0D108BD9-81ED-4DB2-BD59-A6C34878D82A}">
+                    <a16:rowId xmlns:a16="http://schemas.microsoft.com/office/drawing/2014/main" val="1401371461"/>
+                  </a:ext>
+                </a:extLst>
+              </a:tr>
+              <a:tr h="370840">
+                <a:tc>
+                  <a:txBody>
+                    <a:bodyPr/>
+                    <a:lstStyle/>
+                    <a:p>
+                      <a:pPr algn="ctr"/>
+                      <a:r>
+                        <a:rPr lang="en-US" dirty="0">
+                          <a:solidFill>
+                            <a:sysClr val="windowText" lastClr="000000"/>
+                          </a:solidFill>
+                        </a:rPr>
+                        <a:t>0</a:t>
+                      </a:r>
+                    </a:p>
+                  </a:txBody>
+                  <a:tcPr>
+                    <a:lnL w="12700" cap="flat" cmpd="sng" algn="ctr">
+                      <a:solidFill>
+                        <a:schemeClr val="tx1"/>
+                      </a:solidFill>
+                      <a:prstDash val="solid"/>
+                      <a:round/>
+                      <a:headEnd type="none" w="med" len="med"/>
+                      <a:tailEnd type="none" w="med" len="med"/>
+                    </a:lnL>
+                    <a:lnR w="12700" cap="flat" cmpd="sng" algn="ctr">
+                      <a:solidFill>
+                        <a:schemeClr val="tx1"/>
+                      </a:solidFill>
+                      <a:prstDash val="solid"/>
+                      <a:round/>
+                      <a:headEnd type="none" w="med" len="med"/>
+                      <a:tailEnd type="none" w="med" len="med"/>
+                    </a:lnR>
+                    <a:lnT w="12700" cap="flat" cmpd="sng" algn="ctr">
+                      <a:solidFill>
+                        <a:schemeClr val="tx1"/>
+                      </a:solidFill>
+                      <a:prstDash val="solid"/>
+                      <a:round/>
+                      <a:headEnd type="none" w="med" len="med"/>
+                      <a:tailEnd type="none" w="med" len="med"/>
+                    </a:lnT>
+                    <a:lnB w="12700" cap="flat" cmpd="sng" algn="ctr">
+                      <a:solidFill>
+                        <a:schemeClr val="tx1"/>
+                      </a:solidFill>
+                      <a:prstDash val="solid"/>
+                      <a:round/>
+                      <a:headEnd type="none" w="med" len="med"/>
+                      <a:tailEnd type="none" w="med" len="med"/>
+                    </a:lnB>
+                    <a:solidFill>
+                      <a:schemeClr val="bg1"/>
+                    </a:solidFill>
+                  </a:tcPr>
+                </a:tc>
+                <a:tc>
+                  <a:txBody>
+                    <a:bodyPr/>
+                    <a:lstStyle/>
+                    <a:p>
+                      <a:pPr algn="ctr"/>
+                      <a:r>
+                        <a:rPr lang="en-US" dirty="0">
+                          <a:solidFill>
+                            <a:sysClr val="windowText" lastClr="000000"/>
+                          </a:solidFill>
+                        </a:rPr>
+                        <a:t>1</a:t>
+                      </a:r>
+                    </a:p>
+                  </a:txBody>
+                  <a:tcPr>
+                    <a:lnL w="12700" cap="flat" cmpd="sng" algn="ctr">
+                      <a:solidFill>
+                        <a:schemeClr val="tx1"/>
+                      </a:solidFill>
+                      <a:prstDash val="solid"/>
+                      <a:round/>
+                      <a:headEnd type="none" w="med" len="med"/>
+                      <a:tailEnd type="none" w="med" len="med"/>
+                    </a:lnL>
+                    <a:lnR w="12700" cap="flat" cmpd="sng" algn="ctr">
+                      <a:solidFill>
+                        <a:schemeClr val="tx1"/>
+                      </a:solidFill>
+                      <a:prstDash val="solid"/>
+                      <a:round/>
+                      <a:headEnd type="none" w="med" len="med"/>
+                      <a:tailEnd type="none" w="med" len="med"/>
+                    </a:lnR>
+                    <a:lnT w="12700" cap="flat" cmpd="sng" algn="ctr">
+                      <a:solidFill>
+                        <a:schemeClr val="tx1"/>
+                      </a:solidFill>
+                      <a:prstDash val="solid"/>
+                      <a:round/>
+                      <a:headEnd type="none" w="med" len="med"/>
+                      <a:tailEnd type="none" w="med" len="med"/>
+                    </a:lnT>
+                    <a:lnB w="12700" cap="flat" cmpd="sng" algn="ctr">
+                      <a:solidFill>
+                        <a:schemeClr val="tx1"/>
+                      </a:solidFill>
+                      <a:prstDash val="solid"/>
+                      <a:round/>
+                      <a:headEnd type="none" w="med" len="med"/>
+                      <a:tailEnd type="none" w="med" len="med"/>
+                    </a:lnB>
+                    <a:solidFill>
+                      <a:schemeClr val="bg1"/>
+                    </a:solidFill>
+                  </a:tcPr>
+                </a:tc>
+                <a:tc>
+                  <a:txBody>
+                    <a:bodyPr/>
+                    <a:lstStyle/>
+                    <a:p>
+                      <a:pPr algn="ctr"/>
+                      <a:r>
+                        <a:rPr lang="en-US" dirty="0">
+                          <a:solidFill>
+                            <a:sysClr val="windowText" lastClr="000000"/>
+                          </a:solidFill>
+                        </a:rPr>
+                        <a:t>0</a:t>
+                      </a:r>
+                    </a:p>
+                  </a:txBody>
+                  <a:tcPr>
+                    <a:lnL w="12700" cap="flat" cmpd="sng" algn="ctr">
+                      <a:solidFill>
+                        <a:schemeClr val="tx1"/>
+                      </a:solidFill>
+                      <a:prstDash val="solid"/>
+                      <a:round/>
+                      <a:headEnd type="none" w="med" len="med"/>
+                      <a:tailEnd type="none" w="med" len="med"/>
+                    </a:lnL>
+                    <a:lnR w="12700" cap="flat" cmpd="sng" algn="ctr">
+                      <a:solidFill>
+                        <a:schemeClr val="tx1"/>
+                      </a:solidFill>
+                      <a:prstDash val="solid"/>
+                      <a:round/>
+                      <a:headEnd type="none" w="med" len="med"/>
+                      <a:tailEnd type="none" w="med" len="med"/>
+                    </a:lnR>
+                    <a:lnT w="12700" cap="flat" cmpd="sng" algn="ctr">
+                      <a:solidFill>
+                        <a:schemeClr val="tx1"/>
+                      </a:solidFill>
+                      <a:prstDash val="solid"/>
+                      <a:round/>
+                      <a:headEnd type="none" w="med" len="med"/>
+                      <a:tailEnd type="none" w="med" len="med"/>
+                    </a:lnT>
+                    <a:lnB w="12700" cap="flat" cmpd="sng" algn="ctr">
+                      <a:solidFill>
+                        <a:schemeClr val="tx1"/>
+                      </a:solidFill>
+                      <a:prstDash val="solid"/>
+                      <a:round/>
+                      <a:headEnd type="none" w="med" len="med"/>
+                      <a:tailEnd type="none" w="med" len="med"/>
+                    </a:lnB>
+                    <a:solidFill>
+                      <a:schemeClr val="bg1"/>
+                    </a:solidFill>
+                  </a:tcPr>
+                </a:tc>
+                <a:tc>
+                  <a:txBody>
+                    <a:bodyPr/>
+                    <a:lstStyle/>
+                    <a:p>
+                      <a:r>
+                        <a:rPr lang="en-US" dirty="0">
+                          <a:solidFill>
+                            <a:sysClr val="windowText" lastClr="000000"/>
+                          </a:solidFill>
+                        </a:rPr>
+                        <a:t>0.12</a:t>
+                      </a:r>
+                    </a:p>
+                  </a:txBody>
+                  <a:tcPr>
+                    <a:lnL w="12700" cap="flat" cmpd="sng" algn="ctr">
+                      <a:solidFill>
+                        <a:schemeClr val="tx1"/>
+                      </a:solidFill>
+                      <a:prstDash val="solid"/>
+                      <a:round/>
+                      <a:headEnd type="none" w="med" len="med"/>
+                      <a:tailEnd type="none" w="med" len="med"/>
+                    </a:lnL>
+                    <a:lnR w="12700" cap="flat" cmpd="sng" algn="ctr">
+                      <a:solidFill>
+                        <a:schemeClr val="tx1"/>
+                      </a:solidFill>
+                      <a:prstDash val="solid"/>
+                      <a:round/>
+                      <a:headEnd type="none" w="med" len="med"/>
+                      <a:tailEnd type="none" w="med" len="med"/>
+                    </a:lnR>
+                    <a:lnT w="12700" cap="flat" cmpd="sng" algn="ctr">
+                      <a:solidFill>
+                        <a:schemeClr val="tx1"/>
+                      </a:solidFill>
+                      <a:prstDash val="solid"/>
+                      <a:round/>
+                      <a:headEnd type="none" w="med" len="med"/>
+                      <a:tailEnd type="none" w="med" len="med"/>
+                    </a:lnT>
+                    <a:lnB w="12700" cap="flat" cmpd="sng" algn="ctr">
+                      <a:solidFill>
+                        <a:schemeClr val="tx1"/>
+                      </a:solidFill>
+                      <a:prstDash val="solid"/>
+                      <a:round/>
+                      <a:headEnd type="none" w="med" len="med"/>
+                      <a:tailEnd type="none" w="med" len="med"/>
+                    </a:lnB>
+                    <a:solidFill>
+                      <a:schemeClr val="bg1"/>
+                    </a:solidFill>
+                  </a:tcPr>
+                </a:tc>
+                <a:extLst>
+                  <a:ext uri="{0D108BD9-81ED-4DB2-BD59-A6C34878D82A}">
+                    <a16:rowId xmlns:a16="http://schemas.microsoft.com/office/drawing/2014/main" val="1581515868"/>
+                  </a:ext>
+                </a:extLst>
+              </a:tr>
+              <a:tr h="370840">
+                <a:tc>
+                  <a:txBody>
+                    <a:bodyPr/>
+                    <a:lstStyle/>
+                    <a:p>
+                      <a:pPr algn="ctr"/>
+                      <a:r>
+                        <a:rPr lang="en-US" dirty="0">
+                          <a:solidFill>
+                            <a:sysClr val="windowText" lastClr="000000"/>
+                          </a:solidFill>
+                        </a:rPr>
+                        <a:t>0</a:t>
+                      </a:r>
+                    </a:p>
+                  </a:txBody>
+                  <a:tcPr>
+                    <a:lnL w="12700" cap="flat" cmpd="sng" algn="ctr">
+                      <a:solidFill>
+                        <a:schemeClr val="tx1"/>
+                      </a:solidFill>
+                      <a:prstDash val="solid"/>
+                      <a:round/>
+                      <a:headEnd type="none" w="med" len="med"/>
+                      <a:tailEnd type="none" w="med" len="med"/>
+                    </a:lnL>
+                    <a:lnR w="12700" cap="flat" cmpd="sng" algn="ctr">
+                      <a:solidFill>
+                        <a:schemeClr val="tx1"/>
+                      </a:solidFill>
+                      <a:prstDash val="solid"/>
+                      <a:round/>
+                      <a:headEnd type="none" w="med" len="med"/>
+                      <a:tailEnd type="none" w="med" len="med"/>
+                    </a:lnR>
+                    <a:lnT w="12700" cap="flat" cmpd="sng" algn="ctr">
+                      <a:solidFill>
+                        <a:schemeClr val="tx1"/>
+                      </a:solidFill>
+                      <a:prstDash val="solid"/>
+                      <a:round/>
+                      <a:headEnd type="none" w="med" len="med"/>
+                      <a:tailEnd type="none" w="med" len="med"/>
+                    </a:lnT>
+                    <a:lnB w="12700" cap="flat" cmpd="sng" algn="ctr">
+                      <a:solidFill>
+                        <a:schemeClr val="tx1"/>
+                      </a:solidFill>
+                      <a:prstDash val="solid"/>
+                      <a:round/>
+                      <a:headEnd type="none" w="med" len="med"/>
+                      <a:tailEnd type="none" w="med" len="med"/>
+                    </a:lnB>
+                    <a:solidFill>
+                      <a:schemeClr val="bg1"/>
+                    </a:solidFill>
+                  </a:tcPr>
+                </a:tc>
+                <a:tc>
+                  <a:txBody>
+                    <a:bodyPr/>
+                    <a:lstStyle/>
+                    <a:p>
+                      <a:pPr algn="ctr"/>
+                      <a:r>
+                        <a:rPr lang="en-US" dirty="0">
+                          <a:solidFill>
+                            <a:sysClr val="windowText" lastClr="000000"/>
+                          </a:solidFill>
+                        </a:rPr>
+                        <a:t>0</a:t>
+                      </a:r>
+                    </a:p>
+                  </a:txBody>
+                  <a:tcPr>
+                    <a:lnL w="12700" cap="flat" cmpd="sng" algn="ctr">
+                      <a:solidFill>
+                        <a:schemeClr val="tx1"/>
+                      </a:solidFill>
+                      <a:prstDash val="solid"/>
+                      <a:round/>
+                      <a:headEnd type="none" w="med" len="med"/>
+                      <a:tailEnd type="none" w="med" len="med"/>
+                    </a:lnL>
+                    <a:lnR w="12700" cap="flat" cmpd="sng" algn="ctr">
+                      <a:solidFill>
+                        <a:schemeClr val="tx1"/>
+                      </a:solidFill>
+                      <a:prstDash val="solid"/>
+                      <a:round/>
+                      <a:headEnd type="none" w="med" len="med"/>
+                      <a:tailEnd type="none" w="med" len="med"/>
+                    </a:lnR>
+                    <a:lnT w="12700" cap="flat" cmpd="sng" algn="ctr">
+                      <a:solidFill>
+                        <a:schemeClr val="tx1"/>
+                      </a:solidFill>
+                      <a:prstDash val="solid"/>
+                      <a:round/>
+                      <a:headEnd type="none" w="med" len="med"/>
+                      <a:tailEnd type="none" w="med" len="med"/>
+                    </a:lnT>
+                    <a:lnB w="12700" cap="flat" cmpd="sng" algn="ctr">
+                      <a:solidFill>
+                        <a:schemeClr val="tx1"/>
+                      </a:solidFill>
+                      <a:prstDash val="solid"/>
+                      <a:round/>
+                      <a:headEnd type="none" w="med" len="med"/>
+                      <a:tailEnd type="none" w="med" len="med"/>
+                    </a:lnB>
+                    <a:solidFill>
+                      <a:schemeClr val="bg1"/>
+                    </a:solidFill>
+                  </a:tcPr>
+                </a:tc>
+                <a:tc>
+                  <a:txBody>
+                    <a:bodyPr/>
+                    <a:lstStyle/>
+                    <a:p>
+                      <a:pPr algn="ctr"/>
+                      <a:r>
+                        <a:rPr lang="en-US" dirty="0">
+                          <a:solidFill>
+                            <a:sysClr val="windowText" lastClr="000000"/>
+                          </a:solidFill>
+                        </a:rPr>
+                        <a:t>1</a:t>
+                      </a:r>
+                    </a:p>
+                  </a:txBody>
+                  <a:tcPr>
+                    <a:lnL w="12700" cap="flat" cmpd="sng" algn="ctr">
+                      <a:solidFill>
+                        <a:schemeClr val="tx1"/>
+                      </a:solidFill>
+                      <a:prstDash val="solid"/>
+                      <a:round/>
+                      <a:headEnd type="none" w="med" len="med"/>
+                      <a:tailEnd type="none" w="med" len="med"/>
+                    </a:lnL>
+                    <a:lnR w="12700" cap="flat" cmpd="sng" algn="ctr">
+                      <a:solidFill>
+                        <a:schemeClr val="tx1"/>
+                      </a:solidFill>
+                      <a:prstDash val="solid"/>
+                      <a:round/>
+                      <a:headEnd type="none" w="med" len="med"/>
+                      <a:tailEnd type="none" w="med" len="med"/>
+                    </a:lnR>
+                    <a:lnT w="12700" cap="flat" cmpd="sng" algn="ctr">
+                      <a:solidFill>
+                        <a:schemeClr val="tx1"/>
+                      </a:solidFill>
+                      <a:prstDash val="solid"/>
+                      <a:round/>
+                      <a:headEnd type="none" w="med" len="med"/>
+                      <a:tailEnd type="none" w="med" len="med"/>
+                    </a:lnT>
+                    <a:lnB w="12700" cap="flat" cmpd="sng" algn="ctr">
+                      <a:solidFill>
+                        <a:schemeClr val="tx1"/>
+                      </a:solidFill>
+                      <a:prstDash val="solid"/>
+                      <a:round/>
+                      <a:headEnd type="none" w="med" len="med"/>
+                      <a:tailEnd type="none" w="med" len="med"/>
+                    </a:lnB>
+                    <a:solidFill>
+                      <a:schemeClr val="bg1"/>
+                    </a:solidFill>
+                  </a:tcPr>
+                </a:tc>
+                <a:tc>
+                  <a:txBody>
+                    <a:bodyPr/>
+                    <a:lstStyle/>
+                    <a:p>
+                      <a:r>
+                        <a:rPr lang="en-US" dirty="0">
+                          <a:solidFill>
+                            <a:sysClr val="windowText" lastClr="000000"/>
+                          </a:solidFill>
+                        </a:rPr>
+                        <a:t>0.33</a:t>
+                      </a:r>
+                    </a:p>
+                  </a:txBody>
+                  <a:tcPr>
+                    <a:lnL w="12700" cap="flat" cmpd="sng" algn="ctr">
+                      <a:solidFill>
+                        <a:schemeClr val="tx1"/>
+                      </a:solidFill>
+                      <a:prstDash val="solid"/>
+                      <a:round/>
+                      <a:headEnd type="none" w="med" len="med"/>
+                      <a:tailEnd type="none" w="med" len="med"/>
+                    </a:lnL>
+                    <a:lnR w="12700" cap="flat" cmpd="sng" algn="ctr">
+                      <a:solidFill>
+                        <a:schemeClr val="tx1"/>
+                      </a:solidFill>
+                      <a:prstDash val="solid"/>
+                      <a:round/>
+                      <a:headEnd type="none" w="med" len="med"/>
+                      <a:tailEnd type="none" w="med" len="med"/>
+                    </a:lnR>
+                    <a:lnT w="12700" cap="flat" cmpd="sng" algn="ctr">
+                      <a:solidFill>
+                        <a:schemeClr val="tx1"/>
+                      </a:solidFill>
+                      <a:prstDash val="solid"/>
+                      <a:round/>
+                      <a:headEnd type="none" w="med" len="med"/>
+                      <a:tailEnd type="none" w="med" len="med"/>
+                    </a:lnT>
+                    <a:lnB w="12700" cap="flat" cmpd="sng" algn="ctr">
+                      <a:solidFill>
+                        <a:schemeClr val="tx1"/>
+                      </a:solidFill>
+                      <a:prstDash val="solid"/>
+                      <a:round/>
+                      <a:headEnd type="none" w="med" len="med"/>
+                      <a:tailEnd type="none" w="med" len="med"/>
+                    </a:lnB>
+                    <a:solidFill>
+                      <a:schemeClr val="bg1"/>
+                    </a:solidFill>
+                  </a:tcPr>
+                </a:tc>
+                <a:extLst>
+                  <a:ext uri="{0D108BD9-81ED-4DB2-BD59-A6C34878D82A}">
+                    <a16:rowId xmlns:a16="http://schemas.microsoft.com/office/drawing/2014/main" val="3744004049"/>
+                  </a:ext>
+                </a:extLst>
+              </a:tr>
+              <a:tr h="370840">
+                <a:tc>
+                  <a:txBody>
+                    <a:bodyPr/>
+                    <a:lstStyle/>
+                    <a:p>
+                      <a:pPr algn="ctr"/>
+                      <a:r>
+                        <a:rPr lang="en-US" dirty="0">
+                          <a:solidFill>
+                            <a:sysClr val="windowText" lastClr="000000"/>
+                          </a:solidFill>
+                        </a:rPr>
+                        <a:t>0</a:t>
+                      </a:r>
+                    </a:p>
+                  </a:txBody>
+                  <a:tcPr>
+                    <a:lnL w="12700" cap="flat" cmpd="sng" algn="ctr">
+                      <a:solidFill>
+                        <a:schemeClr val="tx1"/>
+                      </a:solidFill>
+                      <a:prstDash val="solid"/>
+                      <a:round/>
+                      <a:headEnd type="none" w="med" len="med"/>
+                      <a:tailEnd type="none" w="med" len="med"/>
+                    </a:lnL>
+                    <a:lnR w="12700" cap="flat" cmpd="sng" algn="ctr">
+                      <a:solidFill>
+                        <a:schemeClr val="tx1"/>
+                      </a:solidFill>
+                      <a:prstDash val="solid"/>
+                      <a:round/>
+                      <a:headEnd type="none" w="med" len="med"/>
+                      <a:tailEnd type="none" w="med" len="med"/>
+                    </a:lnR>
+                    <a:lnT w="12700" cap="flat" cmpd="sng" algn="ctr">
+                      <a:solidFill>
+                        <a:schemeClr val="tx1"/>
+                      </a:solidFill>
+                      <a:prstDash val="solid"/>
+                      <a:round/>
+                      <a:headEnd type="none" w="med" len="med"/>
+                      <a:tailEnd type="none" w="med" len="med"/>
+                    </a:lnT>
+                    <a:lnB w="12700" cap="flat" cmpd="sng" algn="ctr">
+                      <a:solidFill>
+                        <a:schemeClr val="tx1"/>
+                      </a:solidFill>
+                      <a:prstDash val="solid"/>
+                      <a:round/>
+                      <a:headEnd type="none" w="med" len="med"/>
+                      <a:tailEnd type="none" w="med" len="med"/>
+                    </a:lnB>
+                    <a:solidFill>
+                      <a:schemeClr val="bg1"/>
+                    </a:solidFill>
+                  </a:tcPr>
+                </a:tc>
+                <a:tc>
+                  <a:txBody>
+                    <a:bodyPr/>
+                    <a:lstStyle/>
+                    <a:p>
+                      <a:pPr algn="ctr"/>
+                      <a:r>
+                        <a:rPr lang="en-US" dirty="0">
+                          <a:solidFill>
+                            <a:sysClr val="windowText" lastClr="000000"/>
+                          </a:solidFill>
+                        </a:rPr>
+                        <a:t>0</a:t>
+                      </a:r>
+                    </a:p>
+                  </a:txBody>
+                  <a:tcPr>
+                    <a:lnL w="12700" cap="flat" cmpd="sng" algn="ctr">
+                      <a:solidFill>
+                        <a:schemeClr val="tx1"/>
+                      </a:solidFill>
+                      <a:prstDash val="solid"/>
+                      <a:round/>
+                      <a:headEnd type="none" w="med" len="med"/>
+                      <a:tailEnd type="none" w="med" len="med"/>
+                    </a:lnL>
+                    <a:lnR w="12700" cap="flat" cmpd="sng" algn="ctr">
+                      <a:solidFill>
+                        <a:schemeClr val="tx1"/>
+                      </a:solidFill>
+                      <a:prstDash val="solid"/>
+                      <a:round/>
+                      <a:headEnd type="none" w="med" len="med"/>
+                      <a:tailEnd type="none" w="med" len="med"/>
+                    </a:lnR>
+                    <a:lnT w="12700" cap="flat" cmpd="sng" algn="ctr">
+                      <a:solidFill>
+                        <a:schemeClr val="tx1"/>
+                      </a:solidFill>
+                      <a:prstDash val="solid"/>
+                      <a:round/>
+                      <a:headEnd type="none" w="med" len="med"/>
+                      <a:tailEnd type="none" w="med" len="med"/>
+                    </a:lnT>
+                    <a:lnB w="12700" cap="flat" cmpd="sng" algn="ctr">
+                      <a:solidFill>
+                        <a:schemeClr val="tx1"/>
+                      </a:solidFill>
+                      <a:prstDash val="solid"/>
+                      <a:round/>
+                      <a:headEnd type="none" w="med" len="med"/>
+                      <a:tailEnd type="none" w="med" len="med"/>
+                    </a:lnB>
+                    <a:solidFill>
+                      <a:schemeClr val="bg1"/>
+                    </a:solidFill>
+                  </a:tcPr>
+                </a:tc>
+                <a:tc>
+                  <a:txBody>
+                    <a:bodyPr/>
+                    <a:lstStyle/>
+                    <a:p>
+                      <a:pPr algn="ctr"/>
+                      <a:r>
+                        <a:rPr lang="en-US" dirty="0">
+                          <a:solidFill>
+                            <a:sysClr val="windowText" lastClr="000000"/>
+                          </a:solidFill>
+                        </a:rPr>
+                        <a:t>1</a:t>
+                      </a:r>
+                    </a:p>
+                  </a:txBody>
+                  <a:tcPr>
+                    <a:lnL w="12700" cap="flat" cmpd="sng" algn="ctr">
+                      <a:solidFill>
+                        <a:schemeClr val="tx1"/>
+                      </a:solidFill>
+                      <a:prstDash val="solid"/>
+                      <a:round/>
+                      <a:headEnd type="none" w="med" len="med"/>
+                      <a:tailEnd type="none" w="med" len="med"/>
+                    </a:lnL>
+                    <a:lnR w="12700" cap="flat" cmpd="sng" algn="ctr">
+                      <a:solidFill>
+                        <a:schemeClr val="tx1"/>
+                      </a:solidFill>
+                      <a:prstDash val="solid"/>
+                      <a:round/>
+                      <a:headEnd type="none" w="med" len="med"/>
+                      <a:tailEnd type="none" w="med" len="med"/>
+                    </a:lnR>
+                    <a:lnT w="12700" cap="flat" cmpd="sng" algn="ctr">
+                      <a:solidFill>
+                        <a:schemeClr val="tx1"/>
+                      </a:solidFill>
+                      <a:prstDash val="solid"/>
+                      <a:round/>
+                      <a:headEnd type="none" w="med" len="med"/>
+                      <a:tailEnd type="none" w="med" len="med"/>
+                    </a:lnT>
+                    <a:lnB w="12700" cap="flat" cmpd="sng" algn="ctr">
+                      <a:solidFill>
+                        <a:schemeClr val="tx1"/>
+                      </a:solidFill>
+                      <a:prstDash val="solid"/>
+                      <a:round/>
+                      <a:headEnd type="none" w="med" len="med"/>
+                      <a:tailEnd type="none" w="med" len="med"/>
+                    </a:lnB>
+                    <a:solidFill>
+                      <a:schemeClr val="bg1"/>
+                    </a:solidFill>
+                  </a:tcPr>
+                </a:tc>
+                <a:tc>
+                  <a:txBody>
+                    <a:bodyPr/>
+                    <a:lstStyle/>
+                    <a:p>
+                      <a:r>
+                        <a:rPr lang="en-US" dirty="0">
+                          <a:solidFill>
+                            <a:sysClr val="windowText" lastClr="000000"/>
+                          </a:solidFill>
+                        </a:rPr>
+                        <a:t>0.48</a:t>
+                      </a:r>
+                    </a:p>
+                  </a:txBody>
+                  <a:tcPr>
+                    <a:lnL w="12700" cap="flat" cmpd="sng" algn="ctr">
+                      <a:solidFill>
+                        <a:schemeClr val="tx1"/>
+                      </a:solidFill>
+                      <a:prstDash val="solid"/>
+                      <a:round/>
+                      <a:headEnd type="none" w="med" len="med"/>
+                      <a:tailEnd type="none" w="med" len="med"/>
+                    </a:lnL>
+                    <a:lnR w="12700" cap="flat" cmpd="sng" algn="ctr">
+                      <a:solidFill>
+                        <a:schemeClr val="tx1"/>
+                      </a:solidFill>
+                      <a:prstDash val="solid"/>
+                      <a:round/>
+                      <a:headEnd type="none" w="med" len="med"/>
+                      <a:tailEnd type="none" w="med" len="med"/>
+                    </a:lnR>
+                    <a:lnT w="12700" cap="flat" cmpd="sng" algn="ctr">
+                      <a:solidFill>
+                        <a:schemeClr val="tx1"/>
+                      </a:solidFill>
+                      <a:prstDash val="solid"/>
+                      <a:round/>
+                      <a:headEnd type="none" w="med" len="med"/>
+                      <a:tailEnd type="none" w="med" len="med"/>
+                    </a:lnT>
+                    <a:lnB w="12700" cap="flat" cmpd="sng" algn="ctr">
+                      <a:solidFill>
+                        <a:schemeClr val="tx1"/>
+                      </a:solidFill>
+                      <a:prstDash val="solid"/>
+                      <a:round/>
+                      <a:headEnd type="none" w="med" len="med"/>
+                      <a:tailEnd type="none" w="med" len="med"/>
+                    </a:lnB>
+                    <a:solidFill>
+                      <a:schemeClr val="bg1"/>
+                    </a:solidFill>
+                  </a:tcPr>
+                </a:tc>
+                <a:extLst>
+                  <a:ext uri="{0D108BD9-81ED-4DB2-BD59-A6C34878D82A}">
+                    <a16:rowId xmlns:a16="http://schemas.microsoft.com/office/drawing/2014/main" val="747117230"/>
+                  </a:ext>
+                </a:extLst>
+              </a:tr>
+              <a:tr h="370840">
+                <a:tc>
+                  <a:txBody>
+                    <a:bodyPr/>
+                    <a:lstStyle/>
+                    <a:p>
+                      <a:pPr algn="ctr"/>
+                      <a:r>
+                        <a:rPr lang="en-US" dirty="0">
+                          <a:solidFill>
+                            <a:sysClr val="windowText" lastClr="000000"/>
+                          </a:solidFill>
+                        </a:rPr>
+                        <a:t>0</a:t>
+                      </a:r>
+                    </a:p>
+                  </a:txBody>
+                  <a:tcPr>
+                    <a:lnL w="12700" cap="flat" cmpd="sng" algn="ctr">
+                      <a:solidFill>
+                        <a:schemeClr val="tx1"/>
+                      </a:solidFill>
+                      <a:prstDash val="solid"/>
+                      <a:round/>
+                      <a:headEnd type="none" w="med" len="med"/>
+                      <a:tailEnd type="none" w="med" len="med"/>
+                    </a:lnL>
+                    <a:lnR w="12700" cap="flat" cmpd="sng" algn="ctr">
+                      <a:solidFill>
+                        <a:schemeClr val="tx1"/>
+                      </a:solidFill>
+                      <a:prstDash val="solid"/>
+                      <a:round/>
+                      <a:headEnd type="none" w="med" len="med"/>
+                      <a:tailEnd type="none" w="med" len="med"/>
+                    </a:lnR>
+                    <a:lnT w="12700" cap="flat" cmpd="sng" algn="ctr">
+                      <a:solidFill>
+                        <a:schemeClr val="tx1"/>
+                      </a:solidFill>
+                      <a:prstDash val="solid"/>
+                      <a:round/>
+                      <a:headEnd type="none" w="med" len="med"/>
+                      <a:tailEnd type="none" w="med" len="med"/>
+                    </a:lnT>
+                    <a:lnB w="12700" cap="flat" cmpd="sng" algn="ctr">
+                      <a:solidFill>
+                        <a:schemeClr val="tx1"/>
+                      </a:solidFill>
+                      <a:prstDash val="solid"/>
+                      <a:round/>
+                      <a:headEnd type="none" w="med" len="med"/>
+                      <a:tailEnd type="none" w="med" len="med"/>
+                    </a:lnB>
+                    <a:solidFill>
+                      <a:schemeClr val="bg1"/>
+                    </a:solidFill>
+                  </a:tcPr>
+                </a:tc>
+                <a:tc>
+                  <a:txBody>
+                    <a:bodyPr/>
+                    <a:lstStyle/>
+                    <a:p>
+                      <a:pPr algn="ctr"/>
+                      <a:r>
+                        <a:rPr lang="en-US" dirty="0">
+                          <a:solidFill>
+                            <a:sysClr val="windowText" lastClr="000000"/>
+                          </a:solidFill>
+                        </a:rPr>
+                        <a:t>1</a:t>
+                      </a:r>
+                    </a:p>
+                  </a:txBody>
+                  <a:tcPr>
+                    <a:lnL w="12700" cap="flat" cmpd="sng" algn="ctr">
+                      <a:solidFill>
+                        <a:schemeClr val="tx1"/>
+                      </a:solidFill>
+                      <a:prstDash val="solid"/>
+                      <a:round/>
+                      <a:headEnd type="none" w="med" len="med"/>
+                      <a:tailEnd type="none" w="med" len="med"/>
+                    </a:lnL>
+                    <a:lnR w="12700" cap="flat" cmpd="sng" algn="ctr">
+                      <a:solidFill>
+                        <a:schemeClr val="tx1"/>
+                      </a:solidFill>
+                      <a:prstDash val="solid"/>
+                      <a:round/>
+                      <a:headEnd type="none" w="med" len="med"/>
+                      <a:tailEnd type="none" w="med" len="med"/>
+                    </a:lnR>
+                    <a:lnT w="12700" cap="flat" cmpd="sng" algn="ctr">
+                      <a:solidFill>
+                        <a:schemeClr val="tx1"/>
+                      </a:solidFill>
+                      <a:prstDash val="solid"/>
+                      <a:round/>
+                      <a:headEnd type="none" w="med" len="med"/>
+                      <a:tailEnd type="none" w="med" len="med"/>
+                    </a:lnT>
+                    <a:lnB w="12700" cap="flat" cmpd="sng" algn="ctr">
+                      <a:solidFill>
+                        <a:schemeClr val="tx1"/>
+                      </a:solidFill>
+                      <a:prstDash val="solid"/>
+                      <a:round/>
+                      <a:headEnd type="none" w="med" len="med"/>
+                      <a:tailEnd type="none" w="med" len="med"/>
+                    </a:lnB>
+                    <a:solidFill>
+                      <a:schemeClr val="bg1"/>
+                    </a:solidFill>
+                  </a:tcPr>
+                </a:tc>
+                <a:tc>
+                  <a:txBody>
+                    <a:bodyPr/>
+                    <a:lstStyle/>
+                    <a:p>
+                      <a:pPr algn="ctr"/>
+                      <a:r>
+                        <a:rPr lang="en-US" dirty="0">
+                          <a:solidFill>
+                            <a:sysClr val="windowText" lastClr="000000"/>
+                          </a:solidFill>
+                        </a:rPr>
+                        <a:t>0</a:t>
+                      </a:r>
+                    </a:p>
+                  </a:txBody>
+                  <a:tcPr>
+                    <a:lnL w="12700" cap="flat" cmpd="sng" algn="ctr">
+                      <a:solidFill>
+                        <a:schemeClr val="tx1"/>
+                      </a:solidFill>
+                      <a:prstDash val="solid"/>
+                      <a:round/>
+                      <a:headEnd type="none" w="med" len="med"/>
+                      <a:tailEnd type="none" w="med" len="med"/>
+                    </a:lnL>
+                    <a:lnR w="12700" cap="flat" cmpd="sng" algn="ctr">
+                      <a:solidFill>
+                        <a:schemeClr val="tx1"/>
+                      </a:solidFill>
+                      <a:prstDash val="solid"/>
+                      <a:round/>
+                      <a:headEnd type="none" w="med" len="med"/>
+                      <a:tailEnd type="none" w="med" len="med"/>
+                    </a:lnR>
+                    <a:lnT w="12700" cap="flat" cmpd="sng" algn="ctr">
+                      <a:solidFill>
+                        <a:schemeClr val="tx1"/>
+                      </a:solidFill>
+                      <a:prstDash val="solid"/>
+                      <a:round/>
+                      <a:headEnd type="none" w="med" len="med"/>
+                      <a:tailEnd type="none" w="med" len="med"/>
+                    </a:lnT>
+                    <a:lnB w="12700" cap="flat" cmpd="sng" algn="ctr">
+                      <a:solidFill>
+                        <a:schemeClr val="tx1"/>
+                      </a:solidFill>
+                      <a:prstDash val="solid"/>
+                      <a:round/>
+                      <a:headEnd type="none" w="med" len="med"/>
+                      <a:tailEnd type="none" w="med" len="med"/>
+                    </a:lnB>
+                    <a:solidFill>
+                      <a:schemeClr val="bg1"/>
+                    </a:solidFill>
+                  </a:tcPr>
+                </a:tc>
+                <a:tc>
+                  <a:txBody>
+                    <a:bodyPr/>
+                    <a:lstStyle/>
+                    <a:p>
+                      <a:r>
+                        <a:rPr lang="en-US" dirty="0">
+                          <a:solidFill>
+                            <a:sysClr val="windowText" lastClr="000000"/>
+                          </a:solidFill>
+                        </a:rPr>
+                        <a:t>0.20</a:t>
+                      </a:r>
+                    </a:p>
+                  </a:txBody>
+                  <a:tcPr>
+                    <a:lnL w="12700" cap="flat" cmpd="sng" algn="ctr">
+                      <a:solidFill>
+                        <a:schemeClr val="tx1"/>
+                      </a:solidFill>
+                      <a:prstDash val="solid"/>
+                      <a:round/>
+                      <a:headEnd type="none" w="med" len="med"/>
+                      <a:tailEnd type="none" w="med" len="med"/>
+                    </a:lnL>
+                    <a:lnR w="12700" cap="flat" cmpd="sng" algn="ctr">
+                      <a:solidFill>
+                        <a:schemeClr val="tx1"/>
+                      </a:solidFill>
+                      <a:prstDash val="solid"/>
+                      <a:round/>
+                      <a:headEnd type="none" w="med" len="med"/>
+                      <a:tailEnd type="none" w="med" len="med"/>
+                    </a:lnR>
+                    <a:lnT w="12700" cap="flat" cmpd="sng" algn="ctr">
+                      <a:solidFill>
+                        <a:schemeClr val="tx1"/>
+                      </a:solidFill>
+                      <a:prstDash val="solid"/>
+                      <a:round/>
+                      <a:headEnd type="none" w="med" len="med"/>
+                      <a:tailEnd type="none" w="med" len="med"/>
+                    </a:lnT>
+                    <a:lnB w="12700" cap="flat" cmpd="sng" algn="ctr">
+                      <a:solidFill>
+                        <a:schemeClr val="tx1"/>
+                      </a:solidFill>
+                      <a:prstDash val="solid"/>
+                      <a:round/>
+                      <a:headEnd type="none" w="med" len="med"/>
+                      <a:tailEnd type="none" w="med" len="med"/>
+                    </a:lnB>
+                    <a:solidFill>
+                      <a:schemeClr val="bg1"/>
+                    </a:solidFill>
+                  </a:tcPr>
+                </a:tc>
+                <a:extLst>
+                  <a:ext uri="{0D108BD9-81ED-4DB2-BD59-A6C34878D82A}">
+                    <a16:rowId xmlns:a16="http://schemas.microsoft.com/office/drawing/2014/main" val="1031901724"/>
+                  </a:ext>
+                </a:extLst>
+              </a:tr>
+              <a:tr h="370840">
+                <a:tc>
+                  <a:txBody>
+                    <a:bodyPr/>
+                    <a:lstStyle/>
+                    <a:p>
+                      <a:pPr algn="ctr"/>
+                      <a:r>
+                        <a:rPr lang="en-US" dirty="0">
+                          <a:solidFill>
+                            <a:sysClr val="windowText" lastClr="000000"/>
+                          </a:solidFill>
+                        </a:rPr>
+                        <a:t>1</a:t>
+                      </a:r>
+                    </a:p>
+                  </a:txBody>
+                  <a:tcPr>
+                    <a:lnL w="12700" cap="flat" cmpd="sng" algn="ctr">
+                      <a:solidFill>
+                        <a:schemeClr val="tx1"/>
+                      </a:solidFill>
+                      <a:prstDash val="solid"/>
+                      <a:round/>
+                      <a:headEnd type="none" w="med" len="med"/>
+                      <a:tailEnd type="none" w="med" len="med"/>
+                    </a:lnL>
+                    <a:lnR w="12700" cap="flat" cmpd="sng" algn="ctr">
+                      <a:solidFill>
+                        <a:schemeClr val="tx1"/>
+                      </a:solidFill>
+                      <a:prstDash val="solid"/>
+                      <a:round/>
+                      <a:headEnd type="none" w="med" len="med"/>
+                      <a:tailEnd type="none" w="med" len="med"/>
+                    </a:lnR>
+                    <a:lnT w="12700" cap="flat" cmpd="sng" algn="ctr">
+                      <a:solidFill>
+                        <a:schemeClr val="tx1"/>
+                      </a:solidFill>
+                      <a:prstDash val="solid"/>
+                      <a:round/>
+                      <a:headEnd type="none" w="med" len="med"/>
+                      <a:tailEnd type="none" w="med" len="med"/>
+                    </a:lnT>
+                    <a:lnB w="12700" cap="flat" cmpd="sng" algn="ctr">
+                      <a:solidFill>
+                        <a:schemeClr val="tx1"/>
+                      </a:solidFill>
+                      <a:prstDash val="solid"/>
+                      <a:round/>
+                      <a:headEnd type="none" w="med" len="med"/>
+                      <a:tailEnd type="none" w="med" len="med"/>
+                    </a:lnB>
+                    <a:solidFill>
+                      <a:schemeClr val="bg1"/>
+                    </a:solidFill>
+                  </a:tcPr>
+                </a:tc>
+                <a:tc>
+                  <a:txBody>
+                    <a:bodyPr/>
+                    <a:lstStyle/>
+                    <a:p>
+                      <a:pPr algn="ctr"/>
+                      <a:r>
+                        <a:rPr lang="en-US" dirty="0">
+                          <a:solidFill>
+                            <a:sysClr val="windowText" lastClr="000000"/>
+                          </a:solidFill>
+                        </a:rPr>
+                        <a:t>0</a:t>
+                      </a:r>
+                    </a:p>
+                  </a:txBody>
+                  <a:tcPr>
+                    <a:lnL w="12700" cap="flat" cmpd="sng" algn="ctr">
+                      <a:solidFill>
+                        <a:schemeClr val="tx1"/>
+                      </a:solidFill>
+                      <a:prstDash val="solid"/>
+                      <a:round/>
+                      <a:headEnd type="none" w="med" len="med"/>
+                      <a:tailEnd type="none" w="med" len="med"/>
+                    </a:lnL>
+                    <a:lnR w="12700" cap="flat" cmpd="sng" algn="ctr">
+                      <a:solidFill>
+                        <a:schemeClr val="tx1"/>
+                      </a:solidFill>
+                      <a:prstDash val="solid"/>
+                      <a:round/>
+                      <a:headEnd type="none" w="med" len="med"/>
+                      <a:tailEnd type="none" w="med" len="med"/>
+                    </a:lnR>
+                    <a:lnT w="12700" cap="flat" cmpd="sng" algn="ctr">
+                      <a:solidFill>
+                        <a:schemeClr val="tx1"/>
+                      </a:solidFill>
+                      <a:prstDash val="solid"/>
+                      <a:round/>
+                      <a:headEnd type="none" w="med" len="med"/>
+                      <a:tailEnd type="none" w="med" len="med"/>
+                    </a:lnT>
+                    <a:lnB w="12700" cap="flat" cmpd="sng" algn="ctr">
+                      <a:solidFill>
+                        <a:schemeClr val="tx1"/>
+                      </a:solidFill>
+                      <a:prstDash val="solid"/>
+                      <a:round/>
+                      <a:headEnd type="none" w="med" len="med"/>
+                      <a:tailEnd type="none" w="med" len="med"/>
+                    </a:lnB>
+                    <a:solidFill>
+                      <a:schemeClr val="bg1"/>
+                    </a:solidFill>
+                  </a:tcPr>
+                </a:tc>
+                <a:tc>
+                  <a:txBody>
+                    <a:bodyPr/>
+                    <a:lstStyle/>
+                    <a:p>
+                      <a:pPr algn="ctr"/>
+                      <a:r>
+                        <a:rPr lang="en-US" dirty="0">
+                          <a:solidFill>
+                            <a:sysClr val="windowText" lastClr="000000"/>
+                          </a:solidFill>
+                        </a:rPr>
+                        <a:t>0</a:t>
+                      </a:r>
+                    </a:p>
+                  </a:txBody>
+                  <a:tcPr>
+                    <a:lnL w="12700" cap="flat" cmpd="sng" algn="ctr">
+                      <a:solidFill>
+                        <a:schemeClr val="tx1"/>
+                      </a:solidFill>
+                      <a:prstDash val="solid"/>
+                      <a:round/>
+                      <a:headEnd type="none" w="med" len="med"/>
+                      <a:tailEnd type="none" w="med" len="med"/>
+                    </a:lnL>
+                    <a:lnR w="12700" cap="flat" cmpd="sng" algn="ctr">
+                      <a:solidFill>
+                        <a:schemeClr val="tx1"/>
+                      </a:solidFill>
+                      <a:prstDash val="solid"/>
+                      <a:round/>
+                      <a:headEnd type="none" w="med" len="med"/>
+                      <a:tailEnd type="none" w="med" len="med"/>
+                    </a:lnR>
+                    <a:lnT w="12700" cap="flat" cmpd="sng" algn="ctr">
+                      <a:solidFill>
+                        <a:schemeClr val="tx1"/>
+                      </a:solidFill>
+                      <a:prstDash val="solid"/>
+                      <a:round/>
+                      <a:headEnd type="none" w="med" len="med"/>
+                      <a:tailEnd type="none" w="med" len="med"/>
+                    </a:lnT>
+                    <a:lnB w="12700" cap="flat" cmpd="sng" algn="ctr">
+                      <a:solidFill>
+                        <a:schemeClr val="tx1"/>
+                      </a:solidFill>
+                      <a:prstDash val="solid"/>
+                      <a:round/>
+                      <a:headEnd type="none" w="med" len="med"/>
+                      <a:tailEnd type="none" w="med" len="med"/>
+                    </a:lnB>
+                    <a:solidFill>
+                      <a:schemeClr val="bg1"/>
+                    </a:solidFill>
+                  </a:tcPr>
+                </a:tc>
+                <a:tc>
+                  <a:txBody>
+                    <a:bodyPr/>
+                    <a:lstStyle/>
+                    <a:p>
+                      <a:r>
+                        <a:rPr lang="en-US" dirty="0">
+                          <a:solidFill>
+                            <a:sysClr val="windowText" lastClr="000000"/>
+                          </a:solidFill>
+                        </a:rPr>
+                        <a:t>0.78</a:t>
+                      </a:r>
+                    </a:p>
+                  </a:txBody>
+                  <a:tcPr>
+                    <a:lnL w="12700" cap="flat" cmpd="sng" algn="ctr">
+                      <a:solidFill>
+                        <a:schemeClr val="tx1"/>
+                      </a:solidFill>
+                      <a:prstDash val="solid"/>
+                      <a:round/>
+                      <a:headEnd type="none" w="med" len="med"/>
+                      <a:tailEnd type="none" w="med" len="med"/>
+                    </a:lnL>
+                    <a:lnR w="12700" cap="flat" cmpd="sng" algn="ctr">
+                      <a:solidFill>
+                        <a:schemeClr val="tx1"/>
+                      </a:solidFill>
+                      <a:prstDash val="solid"/>
+                      <a:round/>
+                      <a:headEnd type="none" w="med" len="med"/>
+                      <a:tailEnd type="none" w="med" len="med"/>
+                    </a:lnR>
+                    <a:lnT w="12700" cap="flat" cmpd="sng" algn="ctr">
+                      <a:solidFill>
+                        <a:schemeClr val="tx1"/>
+                      </a:solidFill>
+                      <a:prstDash val="solid"/>
+                      <a:round/>
+                      <a:headEnd type="none" w="med" len="med"/>
+                      <a:tailEnd type="none" w="med" len="med"/>
+                    </a:lnT>
+                    <a:lnB w="12700" cap="flat" cmpd="sng" algn="ctr">
+                      <a:solidFill>
+                        <a:schemeClr val="tx1"/>
+                      </a:solidFill>
+                      <a:prstDash val="solid"/>
+                      <a:round/>
+                      <a:headEnd type="none" w="med" len="med"/>
+                      <a:tailEnd type="none" w="med" len="med"/>
+                    </a:lnB>
+                    <a:solidFill>
+                      <a:schemeClr val="bg1"/>
+                    </a:solidFill>
+                  </a:tcPr>
+                </a:tc>
+                <a:extLst>
+                  <a:ext uri="{0D108BD9-81ED-4DB2-BD59-A6C34878D82A}">
+                    <a16:rowId xmlns:a16="http://schemas.microsoft.com/office/drawing/2014/main" val="3282999668"/>
+                  </a:ext>
+                </a:extLst>
+              </a:tr>
+            </a:tbl>
+          </a:graphicData>
+        </a:graphic>
+      </p:graphicFrame>
+      <p:sp>
+        <p:nvSpPr>
+          <p:cNvPr id="7" name="TextBox 6">
+            <a:extLst>
+              <a:ext uri="{FF2B5EF4-FFF2-40B4-BE49-F238E27FC236}">
+                <a16:creationId xmlns:a16="http://schemas.microsoft.com/office/drawing/2014/main" id="{DDF17BCC-DA15-C345-B802-DB768C22875C}"/>
+              </a:ext>
+            </a:extLst>
+          </p:cNvPr>
+          <p:cNvSpPr txBox="1"/>
+          <p:nvPr/>
+        </p:nvSpPr>
+        <p:spPr>
+          <a:xfrm>
+            <a:off x="1748296" y="4156775"/>
+            <a:ext cx="3033266" cy="707886"/>
+          </a:xfrm>
+          <a:prstGeom prst="rect">
+            <a:avLst/>
+          </a:prstGeom>
+          <a:noFill/>
+        </p:spPr>
+        <p:txBody>
+          <a:bodyPr wrap="none" rtlCol="0">
+            <a:spAutoFit/>
+          </a:bodyPr>
+          <a:lstStyle/>
+          <a:p>
+            <a:pPr algn="ctr"/>
+            <a:r>
+              <a:rPr lang="en-US" sz="2000" dirty="0" err="1"/>
+              <a:t>crop_type</a:t>
+            </a:r>
+            <a:r>
+              <a:rPr lang="en-US" sz="2000" dirty="0"/>
+              <a:t> as </a:t>
+            </a:r>
+          </a:p>
+          <a:p>
+            <a:pPr algn="ctr"/>
+            <a:r>
+              <a:rPr lang="en-US" sz="2000" dirty="0"/>
+              <a:t>categorical (factor) variable</a:t>
+            </a:r>
+          </a:p>
+        </p:txBody>
+      </p:sp>
+      <p:sp>
+        <p:nvSpPr>
+          <p:cNvPr id="8" name="TextBox 7">
+            <a:extLst>
+              <a:ext uri="{FF2B5EF4-FFF2-40B4-BE49-F238E27FC236}">
+                <a16:creationId xmlns:a16="http://schemas.microsoft.com/office/drawing/2014/main" id="{238F2D22-AE1B-594B-A69A-C53A856D1AE8}"/>
+              </a:ext>
+            </a:extLst>
+          </p:cNvPr>
+          <p:cNvSpPr txBox="1"/>
+          <p:nvPr/>
+        </p:nvSpPr>
+        <p:spPr>
+          <a:xfrm>
+            <a:off x="5407133" y="4393934"/>
+            <a:ext cx="4328621" cy="400110"/>
+          </a:xfrm>
+          <a:prstGeom prst="rect">
+            <a:avLst/>
+          </a:prstGeom>
+          <a:noFill/>
+        </p:spPr>
+        <p:txBody>
+          <a:bodyPr wrap="none" rtlCol="0">
+            <a:spAutoFit/>
+          </a:bodyPr>
+          <a:lstStyle/>
+          <a:p>
+            <a:pPr algn="ctr"/>
+            <a:r>
+              <a:rPr lang="en-US" sz="2000" dirty="0" err="1"/>
+              <a:t>crop_type</a:t>
+            </a:r>
+            <a:r>
+              <a:rPr lang="en-US" sz="2000" dirty="0"/>
+              <a:t> as binomial dummy variables</a:t>
+            </a:r>
+          </a:p>
+        </p:txBody>
+      </p:sp>
+    </p:spTree>
+    <p:extLst>
+      <p:ext uri="{BB962C8B-B14F-4D97-AF65-F5344CB8AC3E}">
+        <p14:creationId xmlns:p14="http://schemas.microsoft.com/office/powerpoint/2010/main" val="536424686"/>
+      </p:ext>
+    </p:extLst>
+  </p:cSld>
+  <p:clrMapOvr>
+    <a:masterClrMapping/>
+  </p:clrMapOvr>
+</p:sld>
+</file>
+
 <file path=ppt/theme/theme1.xml><?xml version="1.0" encoding="utf-8"?>
 <a:theme xmlns:a="http://schemas.openxmlformats.org/drawingml/2006/main" name="Office Theme">
   <a:themeElements>

</xml_diff>